<commit_message>
animations and change of theme
</commit_message>
<xml_diff>
--- a/OtherStuff/DD all files/Components&Deployment.pptx
+++ b/OtherStuff/DD all files/Components&Deployment.pptx
@@ -2,7 +2,7 @@
 <file path=ppt/presentation.xml><?xml version="1.0" encoding="utf-8"?>
 <p:presentation xmlns:a="http://schemas.openxmlformats.org/drawingml/2006/main" xmlns:r="http://schemas.openxmlformats.org/officeDocument/2006/relationships" xmlns:p="http://schemas.openxmlformats.org/presentationml/2006/main" saveSubsetFonts="1">
   <p:sldMasterIdLst>
-    <p:sldMasterId id="2147483648" r:id="rId1"/>
+    <p:sldMasterId id="2147483660" r:id="rId1"/>
   </p:sldMasterIdLst>
   <p:sldIdLst>
     <p:sldId id="256" r:id="rId2"/>
@@ -116,6 +116,11 @@
 <file path=ppt/slideLayouts/slideLayout1.xml><?xml version="1.0" encoding="utf-8"?>
 <p:sldLayout xmlns:a="http://schemas.openxmlformats.org/drawingml/2006/main" xmlns:r="http://schemas.openxmlformats.org/officeDocument/2006/relationships" xmlns:p="http://schemas.openxmlformats.org/presentationml/2006/main" type="title" preserve="1">
   <p:cSld name="Diapositiva titolo">
+    <p:bg>
+      <p:bgRef idx="1002">
+        <a:schemeClr val="bg2"/>
+      </p:bgRef>
+    </p:bg>
     <p:spTree>
       <p:nvGrpSpPr>
         <p:cNvPr id="1" name=""/>
@@ -132,7 +137,7 @@
       </p:grpSpPr>
       <p:sp>
         <p:nvSpPr>
-          <p:cNvPr id="2" name="Titolo 1"/>
+          <p:cNvPr id="9" name="Title 8"/>
           <p:cNvSpPr>
             <a:spLocks noGrp="1"/>
           </p:cNvSpPr>
@@ -142,144 +147,131 @@
         </p:nvSpPr>
         <p:spPr>
           <a:xfrm>
-            <a:off x="685800" y="1597819"/>
-            <a:ext cx="7772400" cy="1102519"/>
+            <a:off x="533400" y="1028700"/>
+            <a:ext cx="7851648" cy="1371600"/>
+          </a:xfrm>
+          <a:ln>
+            <a:noFill/>
+          </a:ln>
+        </p:spPr>
+        <p:txBody>
+          <a:bodyPr vert="horz" tIns="0" rIns="18288" bIns="0" anchor="b">
+            <a:normAutofit/>
+            <a:scene3d>
+              <a:camera prst="orthographicFront"/>
+              <a:lightRig rig="freezing" dir="t">
+                <a:rot lat="0" lon="0" rev="5640000"/>
+              </a:lightRig>
+            </a:scene3d>
+            <a:sp3d prstMaterial="flat">
+              <a:bevelT w="38100" h="38100"/>
+              <a:contourClr>
+                <a:schemeClr val="tx2"/>
+              </a:contourClr>
+            </a:sp3d>
+          </a:bodyPr>
+          <a:lstStyle>
+            <a:lvl1pPr algn="r" rtl="0">
+              <a:spcBef>
+                <a:spcPct val="0"/>
+              </a:spcBef>
+              <a:buNone/>
+              <a:defRPr sz="5600" b="1">
+                <a:ln>
+                  <a:noFill/>
+                </a:ln>
+                <a:solidFill>
+                  <a:schemeClr val="accent3">
+                    <a:tint val="90000"/>
+                    <a:satMod val="120000"/>
+                  </a:schemeClr>
+                </a:solidFill>
+                <a:effectLst>
+                  <a:outerShdw blurRad="38100" dist="25400" dir="5400000" algn="tl" rotWithShape="0">
+                    <a:srgbClr val="000000">
+                      <a:alpha val="43000"/>
+                    </a:srgbClr>
+                  </a:outerShdw>
+                </a:effectLst>
+                <a:latin typeface="+mj-lt"/>
+                <a:ea typeface="+mj-ea"/>
+                <a:cs typeface="+mj-cs"/>
+              </a:defRPr>
+            </a:lvl1pPr>
+          </a:lstStyle>
+          <a:p>
+            <a:r>
+              <a:rPr kumimoji="0" lang="it-IT" smtClean="0"/>
+              <a:t>Fare clic per modificare lo stile del titolo</a:t>
+            </a:r>
+            <a:endParaRPr kumimoji="0" lang="en-US"/>
+          </a:p>
+        </p:txBody>
+      </p:sp>
+      <p:sp>
+        <p:nvSpPr>
+          <p:cNvPr id="17" name="Subtitle 16"/>
+          <p:cNvSpPr>
+            <a:spLocks noGrp="1"/>
+          </p:cNvSpPr>
+          <p:nvPr>
+            <p:ph type="subTitle" idx="1"/>
+          </p:nvPr>
+        </p:nvSpPr>
+        <p:spPr>
+          <a:xfrm>
+            <a:off x="533400" y="2421402"/>
+            <a:ext cx="7854696" cy="1314450"/>
           </a:xfrm>
         </p:spPr>
         <p:txBody>
-          <a:bodyPr/>
-          <a:lstStyle/>
-          <a:p>
-            <a:r>
-              <a:rPr lang="it-IT" smtClean="0"/>
-              <a:t>Fare clic per modificare lo stile del titolo</a:t>
-            </a:r>
-            <a:endParaRPr lang="it-IT"/>
-          </a:p>
-        </p:txBody>
-      </p:sp>
-      <p:sp>
-        <p:nvSpPr>
-          <p:cNvPr id="3" name="Sottotitolo 2"/>
-          <p:cNvSpPr>
-            <a:spLocks noGrp="1"/>
-          </p:cNvSpPr>
-          <p:nvPr>
-            <p:ph type="subTitle" idx="1"/>
-          </p:nvPr>
-        </p:nvSpPr>
-        <p:spPr>
-          <a:xfrm>
-            <a:off x="1371600" y="2914650"/>
-            <a:ext cx="6400800" cy="1314450"/>
-          </a:xfrm>
-        </p:spPr>
-        <p:txBody>
-          <a:bodyPr/>
+          <a:bodyPr lIns="0" rIns="18288"/>
           <a:lstStyle>
-            <a:lvl1pPr marL="0" indent="0" algn="ctr">
+            <a:lvl1pPr marL="0" marR="45720" indent="0" algn="r">
               <a:buNone/>
               <a:defRPr>
                 <a:solidFill>
-                  <a:schemeClr val="tx1">
-                    <a:tint val="75000"/>
-                  </a:schemeClr>
+                  <a:schemeClr val="tx1"/>
                 </a:solidFill>
               </a:defRPr>
             </a:lvl1pPr>
             <a:lvl2pPr marL="457200" indent="0" algn="ctr">
               <a:buNone/>
-              <a:defRPr>
-                <a:solidFill>
-                  <a:schemeClr val="tx1">
-                    <a:tint val="75000"/>
-                  </a:schemeClr>
-                </a:solidFill>
-              </a:defRPr>
             </a:lvl2pPr>
             <a:lvl3pPr marL="914400" indent="0" algn="ctr">
               <a:buNone/>
-              <a:defRPr>
-                <a:solidFill>
-                  <a:schemeClr val="tx1">
-                    <a:tint val="75000"/>
-                  </a:schemeClr>
-                </a:solidFill>
-              </a:defRPr>
             </a:lvl3pPr>
             <a:lvl4pPr marL="1371600" indent="0" algn="ctr">
               <a:buNone/>
-              <a:defRPr>
-                <a:solidFill>
-                  <a:schemeClr val="tx1">
-                    <a:tint val="75000"/>
-                  </a:schemeClr>
-                </a:solidFill>
-              </a:defRPr>
             </a:lvl4pPr>
             <a:lvl5pPr marL="1828800" indent="0" algn="ctr">
               <a:buNone/>
-              <a:defRPr>
-                <a:solidFill>
-                  <a:schemeClr val="tx1">
-                    <a:tint val="75000"/>
-                  </a:schemeClr>
-                </a:solidFill>
-              </a:defRPr>
             </a:lvl5pPr>
             <a:lvl6pPr marL="2286000" indent="0" algn="ctr">
               <a:buNone/>
-              <a:defRPr>
-                <a:solidFill>
-                  <a:schemeClr val="tx1">
-                    <a:tint val="75000"/>
-                  </a:schemeClr>
-                </a:solidFill>
-              </a:defRPr>
             </a:lvl6pPr>
             <a:lvl7pPr marL="2743200" indent="0" algn="ctr">
               <a:buNone/>
-              <a:defRPr>
-                <a:solidFill>
-                  <a:schemeClr val="tx1">
-                    <a:tint val="75000"/>
-                  </a:schemeClr>
-                </a:solidFill>
-              </a:defRPr>
             </a:lvl7pPr>
             <a:lvl8pPr marL="3200400" indent="0" algn="ctr">
               <a:buNone/>
-              <a:defRPr>
-                <a:solidFill>
-                  <a:schemeClr val="tx1">
-                    <a:tint val="75000"/>
-                  </a:schemeClr>
-                </a:solidFill>
-              </a:defRPr>
             </a:lvl8pPr>
             <a:lvl9pPr marL="3657600" indent="0" algn="ctr">
               <a:buNone/>
-              <a:defRPr>
-                <a:solidFill>
-                  <a:schemeClr val="tx1">
-                    <a:tint val="75000"/>
-                  </a:schemeClr>
-                </a:solidFill>
-              </a:defRPr>
             </a:lvl9pPr>
           </a:lstStyle>
           <a:p>
             <a:r>
-              <a:rPr lang="it-IT" smtClean="0"/>
+              <a:rPr kumimoji="0" lang="it-IT" smtClean="0"/>
               <a:t>Fare clic per modificare lo stile del sottotitolo dello schema</a:t>
             </a:r>
-            <a:endParaRPr lang="it-IT"/>
-          </a:p>
-        </p:txBody>
-      </p:sp>
-      <p:sp>
-        <p:nvSpPr>
-          <p:cNvPr id="4" name="Segnaposto data 3"/>
+            <a:endParaRPr kumimoji="0" lang="en-US"/>
+          </a:p>
+        </p:txBody>
+      </p:sp>
+      <p:sp>
+        <p:nvSpPr>
+          <p:cNvPr id="30" name="Date Placeholder 29"/>
           <p:cNvSpPr>
             <a:spLocks noGrp="1"/>
           </p:cNvSpPr>
@@ -294,7 +286,7 @@
           <a:p>
             <a:fld id="{F6B58D07-D5EF-4EAF-B81C-C86926094AFC}" type="datetimeFigureOut">
               <a:rPr lang="it-IT" smtClean="0"/>
-              <a:t>04/12/2015</a:t>
+              <a:t>05/12/2015</a:t>
             </a:fld>
             <a:endParaRPr lang="it-IT"/>
           </a:p>
@@ -302,7 +294,7 @@
       </p:sp>
       <p:sp>
         <p:nvSpPr>
-          <p:cNvPr id="5" name="Segnaposto piè di pagina 4"/>
+          <p:cNvPr id="19" name="Footer Placeholder 18"/>
           <p:cNvSpPr>
             <a:spLocks noGrp="1"/>
           </p:cNvSpPr>
@@ -321,7 +313,7 @@
       </p:sp>
       <p:sp>
         <p:nvSpPr>
-          <p:cNvPr id="6" name="Segnaposto numero diapositiva 5"/>
+          <p:cNvPr id="27" name="Slide Number Placeholder 26"/>
           <p:cNvSpPr>
             <a:spLocks noGrp="1"/>
           </p:cNvSpPr>
@@ -343,14 +335,9 @@
         </p:txBody>
       </p:sp>
     </p:spTree>
-    <p:extLst>
-      <p:ext uri="{BB962C8B-B14F-4D97-AF65-F5344CB8AC3E}">
-        <p14:creationId xmlns:p14="http://schemas.microsoft.com/office/powerpoint/2010/main" val="1654413472"/>
-      </p:ext>
-    </p:extLst>
   </p:cSld>
   <p:clrMapOvr>
-    <a:masterClrMapping/>
+    <a:overrideClrMapping bg1="dk1" tx1="lt1" bg2="dk2" tx2="lt2" accent1="accent1" accent2="accent2" accent3="accent3" accent4="accent4" accent5="accent5" accent6="accent6" hlink="hlink" folHlink="folHlink"/>
   </p:clrMapOvr>
 </p:sldLayout>
 </file>
@@ -374,7 +361,7 @@
       </p:grpSpPr>
       <p:sp>
         <p:nvSpPr>
-          <p:cNvPr id="2" name="Titolo 1"/>
+          <p:cNvPr id="2" name="Title 1"/>
           <p:cNvSpPr>
             <a:spLocks noGrp="1"/>
           </p:cNvSpPr>
@@ -388,16 +375,16 @@
           <a:lstStyle/>
           <a:p>
             <a:r>
-              <a:rPr lang="it-IT" smtClean="0"/>
+              <a:rPr kumimoji="0" lang="it-IT" smtClean="0"/>
               <a:t>Fare clic per modificare lo stile del titolo</a:t>
             </a:r>
-            <a:endParaRPr lang="it-IT"/>
-          </a:p>
-        </p:txBody>
-      </p:sp>
-      <p:sp>
-        <p:nvSpPr>
-          <p:cNvPr id="3" name="Segnaposto testo verticale 2"/>
+            <a:endParaRPr kumimoji="0" lang="en-US"/>
+          </a:p>
+        </p:txBody>
+      </p:sp>
+      <p:sp>
+        <p:nvSpPr>
+          <p:cNvPr id="3" name="Vertical Text Placeholder 2"/>
           <p:cNvSpPr>
             <a:spLocks noGrp="1"/>
           </p:cNvSpPr>
@@ -410,46 +397,46 @@
           <a:bodyPr vert="eaVert"/>
           <a:lstStyle/>
           <a:p>
-            <a:pPr lvl="0"/>
+            <a:pPr lvl="0" eaLnBrk="1" latinLnBrk="0" hangingPunct="1"/>
             <a:r>
               <a:rPr lang="it-IT" smtClean="0"/>
               <a:t>Fare clic per modificare stili del testo dello schema</a:t>
             </a:r>
           </a:p>
           <a:p>
-            <a:pPr lvl="1"/>
+            <a:pPr lvl="1" eaLnBrk="1" latinLnBrk="0" hangingPunct="1"/>
             <a:r>
               <a:rPr lang="it-IT" smtClean="0"/>
               <a:t>Secondo livello</a:t>
             </a:r>
           </a:p>
           <a:p>
-            <a:pPr lvl="2"/>
+            <a:pPr lvl="2" eaLnBrk="1" latinLnBrk="0" hangingPunct="1"/>
             <a:r>
               <a:rPr lang="it-IT" smtClean="0"/>
               <a:t>Terzo livello</a:t>
             </a:r>
           </a:p>
           <a:p>
-            <a:pPr lvl="3"/>
+            <a:pPr lvl="3" eaLnBrk="1" latinLnBrk="0" hangingPunct="1"/>
             <a:r>
               <a:rPr lang="it-IT" smtClean="0"/>
               <a:t>Quarto livello</a:t>
             </a:r>
           </a:p>
           <a:p>
-            <a:pPr lvl="4"/>
+            <a:pPr lvl="4" eaLnBrk="1" latinLnBrk="0" hangingPunct="1"/>
             <a:r>
               <a:rPr lang="it-IT" smtClean="0"/>
               <a:t>Quinto livello</a:t>
             </a:r>
-            <a:endParaRPr lang="it-IT"/>
-          </a:p>
-        </p:txBody>
-      </p:sp>
-      <p:sp>
-        <p:nvSpPr>
-          <p:cNvPr id="4" name="Segnaposto data 3"/>
+            <a:endParaRPr kumimoji="0" lang="en-US"/>
+          </a:p>
+        </p:txBody>
+      </p:sp>
+      <p:sp>
+        <p:nvSpPr>
+          <p:cNvPr id="4" name="Date Placeholder 3"/>
           <p:cNvSpPr>
             <a:spLocks noGrp="1"/>
           </p:cNvSpPr>
@@ -464,7 +451,7 @@
           <a:p>
             <a:fld id="{F6B58D07-D5EF-4EAF-B81C-C86926094AFC}" type="datetimeFigureOut">
               <a:rPr lang="it-IT" smtClean="0"/>
-              <a:t>04/12/2015</a:t>
+              <a:t>05/12/2015</a:t>
             </a:fld>
             <a:endParaRPr lang="it-IT"/>
           </a:p>
@@ -472,7 +459,7 @@
       </p:sp>
       <p:sp>
         <p:nvSpPr>
-          <p:cNvPr id="5" name="Segnaposto piè di pagina 4"/>
+          <p:cNvPr id="5" name="Footer Placeholder 4"/>
           <p:cNvSpPr>
             <a:spLocks noGrp="1"/>
           </p:cNvSpPr>
@@ -491,7 +478,7 @@
       </p:sp>
       <p:sp>
         <p:nvSpPr>
-          <p:cNvPr id="6" name="Segnaposto numero diapositiva 5"/>
+          <p:cNvPr id="6" name="Slide Number Placeholder 5"/>
           <p:cNvSpPr>
             <a:spLocks noGrp="1"/>
           </p:cNvSpPr>
@@ -513,11 +500,6 @@
         </p:txBody>
       </p:sp>
     </p:spTree>
-    <p:extLst>
-      <p:ext uri="{BB962C8B-B14F-4D97-AF65-F5344CB8AC3E}">
-        <p14:creationId xmlns:p14="http://schemas.microsoft.com/office/powerpoint/2010/main" val="1288295682"/>
-      </p:ext>
-    </p:extLst>
   </p:cSld>
   <p:clrMapOvr>
     <a:masterClrMapping/>
@@ -527,7 +509,7 @@
 
 <file path=ppt/slideLayouts/slideLayout11.xml><?xml version="1.0" encoding="utf-8"?>
 <p:sldLayout xmlns:a="http://schemas.openxmlformats.org/drawingml/2006/main" xmlns:r="http://schemas.openxmlformats.org/officeDocument/2006/relationships" xmlns:p="http://schemas.openxmlformats.org/presentationml/2006/main" type="vertTitleAndTx" preserve="1">
-  <p:cSld name="Titolo e testo verticale">
+  <p:cSld name="1_Titolo e testo verticale">
     <p:spTree>
       <p:nvGrpSpPr>
         <p:cNvPr id="1" name=""/>
@@ -544,7 +526,7 @@
       </p:grpSpPr>
       <p:sp>
         <p:nvSpPr>
-          <p:cNvPr id="2" name="Titolo verticale 1"/>
+          <p:cNvPr id="2" name="Vertical Title 1"/>
           <p:cNvSpPr>
             <a:spLocks noGrp="1"/>
           </p:cNvSpPr>
@@ -554,8 +536,8 @@
         </p:nvSpPr>
         <p:spPr>
           <a:xfrm>
-            <a:off x="6629400" y="205979"/>
-            <a:ext cx="2057400" cy="4388644"/>
+            <a:off x="6629400" y="685801"/>
+            <a:ext cx="2057400" cy="3908822"/>
           </a:xfrm>
         </p:spPr>
         <p:txBody>
@@ -563,16 +545,16 @@
           <a:lstStyle/>
           <a:p>
             <a:r>
-              <a:rPr lang="it-IT" smtClean="0"/>
+              <a:rPr kumimoji="0" lang="it-IT" smtClean="0"/>
               <a:t>Fare clic per modificare lo stile del titolo</a:t>
             </a:r>
-            <a:endParaRPr lang="it-IT"/>
-          </a:p>
-        </p:txBody>
-      </p:sp>
-      <p:sp>
-        <p:nvSpPr>
-          <p:cNvPr id="3" name="Segnaposto testo verticale 2"/>
+            <a:endParaRPr kumimoji="0" lang="en-US"/>
+          </a:p>
+        </p:txBody>
+      </p:sp>
+      <p:sp>
+        <p:nvSpPr>
+          <p:cNvPr id="3" name="Vertical Text Placeholder 2"/>
           <p:cNvSpPr>
             <a:spLocks noGrp="1"/>
           </p:cNvSpPr>
@@ -582,54 +564,54 @@
         </p:nvSpPr>
         <p:spPr>
           <a:xfrm>
-            <a:off x="457200" y="205979"/>
-            <a:ext cx="6019800" cy="4388644"/>
+            <a:off x="457200" y="685801"/>
+            <a:ext cx="6019800" cy="3908822"/>
           </a:xfrm>
         </p:spPr>
         <p:txBody>
           <a:bodyPr vert="eaVert"/>
           <a:lstStyle/>
           <a:p>
-            <a:pPr lvl="0"/>
+            <a:pPr lvl="0" eaLnBrk="1" latinLnBrk="0" hangingPunct="1"/>
             <a:r>
               <a:rPr lang="it-IT" smtClean="0"/>
               <a:t>Fare clic per modificare stili del testo dello schema</a:t>
             </a:r>
           </a:p>
           <a:p>
-            <a:pPr lvl="1"/>
+            <a:pPr lvl="1" eaLnBrk="1" latinLnBrk="0" hangingPunct="1"/>
             <a:r>
               <a:rPr lang="it-IT" smtClean="0"/>
               <a:t>Secondo livello</a:t>
             </a:r>
           </a:p>
           <a:p>
-            <a:pPr lvl="2"/>
+            <a:pPr lvl="2" eaLnBrk="1" latinLnBrk="0" hangingPunct="1"/>
             <a:r>
               <a:rPr lang="it-IT" smtClean="0"/>
               <a:t>Terzo livello</a:t>
             </a:r>
           </a:p>
           <a:p>
-            <a:pPr lvl="3"/>
+            <a:pPr lvl="3" eaLnBrk="1" latinLnBrk="0" hangingPunct="1"/>
             <a:r>
               <a:rPr lang="it-IT" smtClean="0"/>
               <a:t>Quarto livello</a:t>
             </a:r>
           </a:p>
           <a:p>
-            <a:pPr lvl="4"/>
+            <a:pPr lvl="4" eaLnBrk="1" latinLnBrk="0" hangingPunct="1"/>
             <a:r>
               <a:rPr lang="it-IT" smtClean="0"/>
               <a:t>Quinto livello</a:t>
             </a:r>
-            <a:endParaRPr lang="it-IT"/>
-          </a:p>
-        </p:txBody>
-      </p:sp>
-      <p:sp>
-        <p:nvSpPr>
-          <p:cNvPr id="4" name="Segnaposto data 3"/>
+            <a:endParaRPr kumimoji="0" lang="en-US"/>
+          </a:p>
+        </p:txBody>
+      </p:sp>
+      <p:sp>
+        <p:nvSpPr>
+          <p:cNvPr id="4" name="Date Placeholder 3"/>
           <p:cNvSpPr>
             <a:spLocks noGrp="1"/>
           </p:cNvSpPr>
@@ -644,7 +626,7 @@
           <a:p>
             <a:fld id="{F6B58D07-D5EF-4EAF-B81C-C86926094AFC}" type="datetimeFigureOut">
               <a:rPr lang="it-IT" smtClean="0"/>
-              <a:t>04/12/2015</a:t>
+              <a:t>05/12/2015</a:t>
             </a:fld>
             <a:endParaRPr lang="it-IT"/>
           </a:p>
@@ -652,7 +634,7 @@
       </p:sp>
       <p:sp>
         <p:nvSpPr>
-          <p:cNvPr id="5" name="Segnaposto piè di pagina 4"/>
+          <p:cNvPr id="5" name="Footer Placeholder 4"/>
           <p:cNvSpPr>
             <a:spLocks noGrp="1"/>
           </p:cNvSpPr>
@@ -671,7 +653,7 @@
       </p:sp>
       <p:sp>
         <p:nvSpPr>
-          <p:cNvPr id="6" name="Segnaposto numero diapositiva 5"/>
+          <p:cNvPr id="6" name="Slide Number Placeholder 5"/>
           <p:cNvSpPr>
             <a:spLocks noGrp="1"/>
           </p:cNvSpPr>
@@ -693,11 +675,6 @@
         </p:txBody>
       </p:sp>
     </p:spTree>
-    <p:extLst>
-      <p:ext uri="{BB962C8B-B14F-4D97-AF65-F5344CB8AC3E}">
-        <p14:creationId xmlns:p14="http://schemas.microsoft.com/office/powerpoint/2010/main" val="3460031856"/>
-      </p:ext>
-    </p:extLst>
   </p:cSld>
   <p:clrMapOvr>
     <a:masterClrMapping/>
@@ -724,7 +701,7 @@
       </p:grpSpPr>
       <p:sp>
         <p:nvSpPr>
-          <p:cNvPr id="2" name="Titolo 1"/>
+          <p:cNvPr id="2" name="Title 1"/>
           <p:cNvSpPr>
             <a:spLocks noGrp="1"/>
           </p:cNvSpPr>
@@ -738,16 +715,16 @@
           <a:lstStyle/>
           <a:p>
             <a:r>
-              <a:rPr lang="it-IT" smtClean="0"/>
+              <a:rPr kumimoji="0" lang="it-IT" smtClean="0"/>
               <a:t>Fare clic per modificare lo stile del titolo</a:t>
             </a:r>
-            <a:endParaRPr lang="it-IT"/>
-          </a:p>
-        </p:txBody>
-      </p:sp>
-      <p:sp>
-        <p:nvSpPr>
-          <p:cNvPr id="3" name="Segnaposto contenuto 2"/>
+            <a:endParaRPr kumimoji="0" lang="en-US"/>
+          </a:p>
+        </p:txBody>
+      </p:sp>
+      <p:sp>
+        <p:nvSpPr>
+          <p:cNvPr id="3" name="Content Placeholder 2"/>
           <p:cNvSpPr>
             <a:spLocks noGrp="1"/>
           </p:cNvSpPr>
@@ -760,46 +737,46 @@
           <a:bodyPr/>
           <a:lstStyle/>
           <a:p>
-            <a:pPr lvl="0"/>
+            <a:pPr lvl="0" eaLnBrk="1" latinLnBrk="0" hangingPunct="1"/>
             <a:r>
               <a:rPr lang="it-IT" smtClean="0"/>
               <a:t>Fare clic per modificare stili del testo dello schema</a:t>
             </a:r>
           </a:p>
           <a:p>
-            <a:pPr lvl="1"/>
+            <a:pPr lvl="1" eaLnBrk="1" latinLnBrk="0" hangingPunct="1"/>
             <a:r>
               <a:rPr lang="it-IT" smtClean="0"/>
               <a:t>Secondo livello</a:t>
             </a:r>
           </a:p>
           <a:p>
-            <a:pPr lvl="2"/>
+            <a:pPr lvl="2" eaLnBrk="1" latinLnBrk="0" hangingPunct="1"/>
             <a:r>
               <a:rPr lang="it-IT" smtClean="0"/>
               <a:t>Terzo livello</a:t>
             </a:r>
           </a:p>
           <a:p>
-            <a:pPr lvl="3"/>
+            <a:pPr lvl="3" eaLnBrk="1" latinLnBrk="0" hangingPunct="1"/>
             <a:r>
               <a:rPr lang="it-IT" smtClean="0"/>
               <a:t>Quarto livello</a:t>
             </a:r>
           </a:p>
           <a:p>
-            <a:pPr lvl="4"/>
+            <a:pPr lvl="4" eaLnBrk="1" latinLnBrk="0" hangingPunct="1"/>
             <a:r>
               <a:rPr lang="it-IT" smtClean="0"/>
               <a:t>Quinto livello</a:t>
             </a:r>
-            <a:endParaRPr lang="it-IT"/>
-          </a:p>
-        </p:txBody>
-      </p:sp>
-      <p:sp>
-        <p:nvSpPr>
-          <p:cNvPr id="4" name="Segnaposto data 3"/>
+            <a:endParaRPr kumimoji="0" lang="en-US"/>
+          </a:p>
+        </p:txBody>
+      </p:sp>
+      <p:sp>
+        <p:nvSpPr>
+          <p:cNvPr id="4" name="Date Placeholder 3"/>
           <p:cNvSpPr>
             <a:spLocks noGrp="1"/>
           </p:cNvSpPr>
@@ -814,7 +791,7 @@
           <a:p>
             <a:fld id="{F6B58D07-D5EF-4EAF-B81C-C86926094AFC}" type="datetimeFigureOut">
               <a:rPr lang="it-IT" smtClean="0"/>
-              <a:t>04/12/2015</a:t>
+              <a:t>05/12/2015</a:t>
             </a:fld>
             <a:endParaRPr lang="it-IT"/>
           </a:p>
@@ -822,7 +799,7 @@
       </p:sp>
       <p:sp>
         <p:nvSpPr>
-          <p:cNvPr id="5" name="Segnaposto piè di pagina 4"/>
+          <p:cNvPr id="5" name="Footer Placeholder 4"/>
           <p:cNvSpPr>
             <a:spLocks noGrp="1"/>
           </p:cNvSpPr>
@@ -841,7 +818,7 @@
       </p:sp>
       <p:sp>
         <p:nvSpPr>
-          <p:cNvPr id="6" name="Segnaposto numero diapositiva 5"/>
+          <p:cNvPr id="6" name="Slide Number Placeholder 5"/>
           <p:cNvSpPr>
             <a:spLocks noGrp="1"/>
           </p:cNvSpPr>
@@ -863,11 +840,6 @@
         </p:txBody>
       </p:sp>
     </p:spTree>
-    <p:extLst>
-      <p:ext uri="{BB962C8B-B14F-4D97-AF65-F5344CB8AC3E}">
-        <p14:creationId xmlns:p14="http://schemas.microsoft.com/office/powerpoint/2010/main" val="1619999684"/>
-      </p:ext>
-    </p:extLst>
   </p:cSld>
   <p:clrMapOvr>
     <a:masterClrMapping/>
@@ -878,6 +850,11 @@
 <file path=ppt/slideLayouts/slideLayout3.xml><?xml version="1.0" encoding="utf-8"?>
 <p:sldLayout xmlns:a="http://schemas.openxmlformats.org/drawingml/2006/main" xmlns:r="http://schemas.openxmlformats.org/officeDocument/2006/relationships" xmlns:p="http://schemas.openxmlformats.org/presentationml/2006/main" type="secHead" preserve="1">
   <p:cSld name="Intestazione sezione">
+    <p:bg>
+      <p:bgRef idx="1002">
+        <a:schemeClr val="bg2"/>
+      </p:bgRef>
+    </p:bg>
     <p:spTree>
       <p:nvGrpSpPr>
         <p:cNvPr id="1" name=""/>
@@ -894,7 +871,7 @@
       </p:grpSpPr>
       <p:sp>
         <p:nvSpPr>
-          <p:cNvPr id="2" name="Titolo 1"/>
+          <p:cNvPr id="2" name="Title 1"/>
           <p:cNvSpPr>
             <a:spLocks noGrp="1"/>
           </p:cNvSpPr>
@@ -904,56 +881,92 @@
         </p:nvSpPr>
         <p:spPr>
           <a:xfrm>
-            <a:off x="722313" y="3305176"/>
-            <a:ext cx="7772400" cy="1021556"/>
+            <a:off x="530352" y="987552"/>
+            <a:ext cx="7772400" cy="1021842"/>
+          </a:xfrm>
+          <a:ln>
+            <a:noFill/>
+          </a:ln>
+        </p:spPr>
+        <p:txBody>
+          <a:bodyPr vert="horz" tIns="0" bIns="0" anchor="b">
+            <a:noAutofit/>
+            <a:scene3d>
+              <a:camera prst="orthographicFront"/>
+              <a:lightRig rig="freezing" dir="t">
+                <a:rot lat="0" lon="0" rev="5640000"/>
+              </a:lightRig>
+            </a:scene3d>
+            <a:sp3d prstMaterial="flat">
+              <a:bevelT w="38100" h="38100"/>
+            </a:sp3d>
+          </a:bodyPr>
+          <a:lstStyle>
+            <a:lvl1pPr algn="l" rtl="0">
+              <a:spcBef>
+                <a:spcPct val="0"/>
+              </a:spcBef>
+              <a:buNone/>
+              <a:defRPr lang="en-US" sz="5600" b="1" cap="none" baseline="0" dirty="0">
+                <a:ln w="635">
+                  <a:noFill/>
+                </a:ln>
+                <a:solidFill>
+                  <a:schemeClr val="accent4">
+                    <a:tint val="90000"/>
+                    <a:satMod val="125000"/>
+                  </a:schemeClr>
+                </a:solidFill>
+                <a:effectLst>
+                  <a:outerShdw blurRad="38100" dist="25400" dir="5400000" algn="tl" rotWithShape="0">
+                    <a:srgbClr val="000000">
+                      <a:alpha val="43000"/>
+                    </a:srgbClr>
+                  </a:outerShdw>
+                </a:effectLst>
+                <a:latin typeface="+mj-lt"/>
+                <a:ea typeface="+mj-ea"/>
+                <a:cs typeface="+mj-cs"/>
+              </a:defRPr>
+            </a:lvl1pPr>
+          </a:lstStyle>
+          <a:p>
+            <a:r>
+              <a:rPr kumimoji="0" lang="it-IT" smtClean="0"/>
+              <a:t>Fare clic per modificare lo stile del titolo</a:t>
+            </a:r>
+            <a:endParaRPr kumimoji="0" lang="en-US"/>
+          </a:p>
+        </p:txBody>
+      </p:sp>
+      <p:sp>
+        <p:nvSpPr>
+          <p:cNvPr id="3" name="Text Placeholder 2"/>
+          <p:cNvSpPr>
+            <a:spLocks noGrp="1"/>
+          </p:cNvSpPr>
+          <p:nvPr>
+            <p:ph type="body" idx="1"/>
+          </p:nvPr>
+        </p:nvSpPr>
+        <p:spPr>
+          <a:xfrm>
+            <a:off x="530352" y="2028498"/>
+            <a:ext cx="7772400" cy="1132284"/>
           </a:xfrm>
         </p:spPr>
         <p:txBody>
-          <a:bodyPr anchor="t"/>
-          <a:lstStyle>
-            <a:lvl1pPr algn="l">
-              <a:defRPr sz="4000" b="1" cap="all"/>
-            </a:lvl1pPr>
-          </a:lstStyle>
-          <a:p>
-            <a:r>
-              <a:rPr lang="it-IT" smtClean="0"/>
-              <a:t>Fare clic per modificare lo stile del titolo</a:t>
-            </a:r>
-            <a:endParaRPr lang="it-IT"/>
-          </a:p>
-        </p:txBody>
-      </p:sp>
-      <p:sp>
-        <p:nvSpPr>
-          <p:cNvPr id="3" name="Segnaposto testo 2"/>
-          <p:cNvSpPr>
-            <a:spLocks noGrp="1"/>
-          </p:cNvSpPr>
-          <p:nvPr>
-            <p:ph type="body" idx="1"/>
-          </p:nvPr>
-        </p:nvSpPr>
-        <p:spPr>
-          <a:xfrm>
-            <a:off x="722313" y="2180035"/>
-            <a:ext cx="7772400" cy="1125140"/>
-          </a:xfrm>
-        </p:spPr>
-        <p:txBody>
-          <a:bodyPr anchor="b"/>
+          <a:bodyPr lIns="45720" rIns="45720" anchor="t"/>
           <a:lstStyle>
             <a:lvl1pPr marL="0" indent="0">
               <a:buNone/>
-              <a:defRPr sz="2000">
+              <a:defRPr sz="2200">
                 <a:solidFill>
-                  <a:schemeClr val="tx1">
-                    <a:tint val="75000"/>
-                  </a:schemeClr>
+                  <a:schemeClr val="tx1"/>
                 </a:solidFill>
               </a:defRPr>
             </a:lvl1pPr>
-            <a:lvl2pPr marL="457200" indent="0">
+            <a:lvl2pPr>
               <a:buNone/>
               <a:defRPr sz="1800">
                 <a:solidFill>
@@ -963,7 +976,7 @@
                 </a:solidFill>
               </a:defRPr>
             </a:lvl2pPr>
-            <a:lvl3pPr marL="914400" indent="0">
+            <a:lvl3pPr>
               <a:buNone/>
               <a:defRPr sz="1600">
                 <a:solidFill>
@@ -973,7 +986,7 @@
                 </a:solidFill>
               </a:defRPr>
             </a:lvl3pPr>
-            <a:lvl4pPr marL="1371600" indent="0">
+            <a:lvl4pPr>
               <a:buNone/>
               <a:defRPr sz="1400">
                 <a:solidFill>
@@ -983,7 +996,7 @@
                 </a:solidFill>
               </a:defRPr>
             </a:lvl4pPr>
-            <a:lvl5pPr marL="1828800" indent="0">
+            <a:lvl5pPr>
               <a:buNone/>
               <a:defRPr sz="1400">
                 <a:solidFill>
@@ -993,51 +1006,11 @@
                 </a:solidFill>
               </a:defRPr>
             </a:lvl5pPr>
-            <a:lvl6pPr marL="2286000" indent="0">
-              <a:buNone/>
-              <a:defRPr sz="1400">
-                <a:solidFill>
-                  <a:schemeClr val="tx1">
-                    <a:tint val="75000"/>
-                  </a:schemeClr>
-                </a:solidFill>
-              </a:defRPr>
-            </a:lvl6pPr>
-            <a:lvl7pPr marL="2743200" indent="0">
-              <a:buNone/>
-              <a:defRPr sz="1400">
-                <a:solidFill>
-                  <a:schemeClr val="tx1">
-                    <a:tint val="75000"/>
-                  </a:schemeClr>
-                </a:solidFill>
-              </a:defRPr>
-            </a:lvl7pPr>
-            <a:lvl8pPr marL="3200400" indent="0">
-              <a:buNone/>
-              <a:defRPr sz="1400">
-                <a:solidFill>
-                  <a:schemeClr val="tx1">
-                    <a:tint val="75000"/>
-                  </a:schemeClr>
-                </a:solidFill>
-              </a:defRPr>
-            </a:lvl8pPr>
-            <a:lvl9pPr marL="3657600" indent="0">
-              <a:buNone/>
-              <a:defRPr sz="1400">
-                <a:solidFill>
-                  <a:schemeClr val="tx1">
-                    <a:tint val="75000"/>
-                  </a:schemeClr>
-                </a:solidFill>
-              </a:defRPr>
-            </a:lvl9pPr>
           </a:lstStyle>
           <a:p>
-            <a:pPr lvl="0"/>
-            <a:r>
-              <a:rPr lang="it-IT" smtClean="0"/>
+            <a:pPr lvl="0" eaLnBrk="1" latinLnBrk="0" hangingPunct="1"/>
+            <a:r>
+              <a:rPr kumimoji="0" lang="it-IT" smtClean="0"/>
               <a:t>Fare clic per modificare stili del testo dello schema</a:t>
             </a:r>
           </a:p>
@@ -1045,7 +1018,7 @@
       </p:sp>
       <p:sp>
         <p:nvSpPr>
-          <p:cNvPr id="4" name="Segnaposto data 3"/>
+          <p:cNvPr id="4" name="Date Placeholder 3"/>
           <p:cNvSpPr>
             <a:spLocks noGrp="1"/>
           </p:cNvSpPr>
@@ -1060,7 +1033,7 @@
           <a:p>
             <a:fld id="{F6B58D07-D5EF-4EAF-B81C-C86926094AFC}" type="datetimeFigureOut">
               <a:rPr lang="it-IT" smtClean="0"/>
-              <a:t>04/12/2015</a:t>
+              <a:t>05/12/2015</a:t>
             </a:fld>
             <a:endParaRPr lang="it-IT"/>
           </a:p>
@@ -1068,7 +1041,7 @@
       </p:sp>
       <p:sp>
         <p:nvSpPr>
-          <p:cNvPr id="5" name="Segnaposto piè di pagina 4"/>
+          <p:cNvPr id="5" name="Footer Placeholder 4"/>
           <p:cNvSpPr>
             <a:spLocks noGrp="1"/>
           </p:cNvSpPr>
@@ -1087,7 +1060,7 @@
       </p:sp>
       <p:sp>
         <p:nvSpPr>
-          <p:cNvPr id="6" name="Segnaposto numero diapositiva 5"/>
+          <p:cNvPr id="6" name="Slide Number Placeholder 5"/>
           <p:cNvSpPr>
             <a:spLocks noGrp="1"/>
           </p:cNvSpPr>
@@ -1109,14 +1082,9 @@
         </p:txBody>
       </p:sp>
     </p:spTree>
-    <p:extLst>
-      <p:ext uri="{BB962C8B-B14F-4D97-AF65-F5344CB8AC3E}">
-        <p14:creationId xmlns:p14="http://schemas.microsoft.com/office/powerpoint/2010/main" val="468944607"/>
-      </p:ext>
-    </p:extLst>
   </p:cSld>
   <p:clrMapOvr>
-    <a:masterClrMapping/>
+    <a:overrideClrMapping bg1="dk1" tx1="lt1" bg2="dk2" tx2="lt2" accent1="accent1" accent2="accent2" accent3="accent3" accent4="accent4" accent5="accent5" accent6="accent6" hlink="hlink" folHlink="folHlink"/>
   </p:clrMapOvr>
 </p:sldLayout>
 </file>
@@ -1140,7 +1108,7 @@
       </p:grpSpPr>
       <p:sp>
         <p:nvSpPr>
-          <p:cNvPr id="2" name="Titolo 1"/>
+          <p:cNvPr id="2" name="Title 1"/>
           <p:cNvSpPr>
             <a:spLocks noGrp="1"/>
           </p:cNvSpPr>
@@ -1148,22 +1116,27 @@
             <p:ph type="title"/>
           </p:nvPr>
         </p:nvSpPr>
-        <p:spPr/>
+        <p:spPr>
+          <a:xfrm>
+            <a:off x="457200" y="528066"/>
+            <a:ext cx="8229600" cy="857250"/>
+          </a:xfrm>
+        </p:spPr>
         <p:txBody>
           <a:bodyPr/>
           <a:lstStyle/>
           <a:p>
             <a:r>
-              <a:rPr lang="it-IT" smtClean="0"/>
+              <a:rPr kumimoji="0" lang="it-IT" smtClean="0"/>
               <a:t>Fare clic per modificare lo stile del titolo</a:t>
             </a:r>
-            <a:endParaRPr lang="it-IT"/>
-          </a:p>
-        </p:txBody>
-      </p:sp>
-      <p:sp>
-        <p:nvSpPr>
-          <p:cNvPr id="3" name="Segnaposto contenuto 2"/>
+            <a:endParaRPr kumimoji="0" lang="en-US"/>
+          </a:p>
+        </p:txBody>
+      </p:sp>
+      <p:sp>
+        <p:nvSpPr>
+          <p:cNvPr id="3" name="Content Placeholder 2"/>
           <p:cNvSpPr>
             <a:spLocks noGrp="1"/>
           </p:cNvSpPr>
@@ -1173,15 +1146,15 @@
         </p:nvSpPr>
         <p:spPr>
           <a:xfrm>
-            <a:off x="457200" y="1200151"/>
-            <a:ext cx="4038600" cy="3394472"/>
+            <a:off x="457200" y="1440064"/>
+            <a:ext cx="4038600" cy="3326130"/>
           </a:xfrm>
         </p:spPr>
         <p:txBody>
           <a:bodyPr/>
           <a:lstStyle>
             <a:lvl1pPr>
-              <a:defRPr sz="2800"/>
+              <a:defRPr sz="2600"/>
             </a:lvl1pPr>
             <a:lvl2pPr>
               <a:defRPr sz="2400"/>
@@ -1195,60 +1168,48 @@
             <a:lvl5pPr>
               <a:defRPr sz="1800"/>
             </a:lvl5pPr>
-            <a:lvl6pPr>
-              <a:defRPr sz="1800"/>
-            </a:lvl6pPr>
-            <a:lvl7pPr>
-              <a:defRPr sz="1800"/>
-            </a:lvl7pPr>
-            <a:lvl8pPr>
-              <a:defRPr sz="1800"/>
-            </a:lvl8pPr>
-            <a:lvl9pPr>
-              <a:defRPr sz="1800"/>
-            </a:lvl9pPr>
           </a:lstStyle>
           <a:p>
-            <a:pPr lvl="0"/>
+            <a:pPr lvl="0" eaLnBrk="1" latinLnBrk="0" hangingPunct="1"/>
             <a:r>
               <a:rPr lang="it-IT" smtClean="0"/>
               <a:t>Fare clic per modificare stili del testo dello schema</a:t>
             </a:r>
           </a:p>
           <a:p>
-            <a:pPr lvl="1"/>
+            <a:pPr lvl="1" eaLnBrk="1" latinLnBrk="0" hangingPunct="1"/>
             <a:r>
               <a:rPr lang="it-IT" smtClean="0"/>
               <a:t>Secondo livello</a:t>
             </a:r>
           </a:p>
           <a:p>
-            <a:pPr lvl="2"/>
+            <a:pPr lvl="2" eaLnBrk="1" latinLnBrk="0" hangingPunct="1"/>
             <a:r>
               <a:rPr lang="it-IT" smtClean="0"/>
               <a:t>Terzo livello</a:t>
             </a:r>
           </a:p>
           <a:p>
-            <a:pPr lvl="3"/>
+            <a:pPr lvl="3" eaLnBrk="1" latinLnBrk="0" hangingPunct="1"/>
             <a:r>
               <a:rPr lang="it-IT" smtClean="0"/>
               <a:t>Quarto livello</a:t>
             </a:r>
           </a:p>
           <a:p>
-            <a:pPr lvl="4"/>
+            <a:pPr lvl="4" eaLnBrk="1" latinLnBrk="0" hangingPunct="1"/>
             <a:r>
               <a:rPr lang="it-IT" smtClean="0"/>
               <a:t>Quinto livello</a:t>
             </a:r>
-            <a:endParaRPr lang="it-IT"/>
-          </a:p>
-        </p:txBody>
-      </p:sp>
-      <p:sp>
-        <p:nvSpPr>
-          <p:cNvPr id="4" name="Segnaposto contenuto 3"/>
+            <a:endParaRPr kumimoji="0" lang="en-US"/>
+          </a:p>
+        </p:txBody>
+      </p:sp>
+      <p:sp>
+        <p:nvSpPr>
+          <p:cNvPr id="4" name="Content Placeholder 3"/>
           <p:cNvSpPr>
             <a:spLocks noGrp="1"/>
           </p:cNvSpPr>
@@ -1258,15 +1219,15 @@
         </p:nvSpPr>
         <p:spPr>
           <a:xfrm>
-            <a:off x="4648200" y="1200151"/>
-            <a:ext cx="4038600" cy="3394472"/>
+            <a:off x="4648200" y="1440064"/>
+            <a:ext cx="4038600" cy="3326130"/>
           </a:xfrm>
         </p:spPr>
         <p:txBody>
           <a:bodyPr/>
           <a:lstStyle>
             <a:lvl1pPr>
-              <a:defRPr sz="2800"/>
+              <a:defRPr sz="2600"/>
             </a:lvl1pPr>
             <a:lvl2pPr>
               <a:defRPr sz="2400"/>
@@ -1280,60 +1241,48 @@
             <a:lvl5pPr>
               <a:defRPr sz="1800"/>
             </a:lvl5pPr>
-            <a:lvl6pPr>
-              <a:defRPr sz="1800"/>
-            </a:lvl6pPr>
-            <a:lvl7pPr>
-              <a:defRPr sz="1800"/>
-            </a:lvl7pPr>
-            <a:lvl8pPr>
-              <a:defRPr sz="1800"/>
-            </a:lvl8pPr>
-            <a:lvl9pPr>
-              <a:defRPr sz="1800"/>
-            </a:lvl9pPr>
           </a:lstStyle>
           <a:p>
-            <a:pPr lvl="0"/>
+            <a:pPr lvl="0" eaLnBrk="1" latinLnBrk="0" hangingPunct="1"/>
             <a:r>
               <a:rPr lang="it-IT" smtClean="0"/>
               <a:t>Fare clic per modificare stili del testo dello schema</a:t>
             </a:r>
           </a:p>
           <a:p>
-            <a:pPr lvl="1"/>
+            <a:pPr lvl="1" eaLnBrk="1" latinLnBrk="0" hangingPunct="1"/>
             <a:r>
               <a:rPr lang="it-IT" smtClean="0"/>
               <a:t>Secondo livello</a:t>
             </a:r>
           </a:p>
           <a:p>
-            <a:pPr lvl="2"/>
+            <a:pPr lvl="2" eaLnBrk="1" latinLnBrk="0" hangingPunct="1"/>
             <a:r>
               <a:rPr lang="it-IT" smtClean="0"/>
               <a:t>Terzo livello</a:t>
             </a:r>
           </a:p>
           <a:p>
-            <a:pPr lvl="3"/>
+            <a:pPr lvl="3" eaLnBrk="1" latinLnBrk="0" hangingPunct="1"/>
             <a:r>
               <a:rPr lang="it-IT" smtClean="0"/>
               <a:t>Quarto livello</a:t>
             </a:r>
           </a:p>
           <a:p>
-            <a:pPr lvl="4"/>
+            <a:pPr lvl="4" eaLnBrk="1" latinLnBrk="0" hangingPunct="1"/>
             <a:r>
               <a:rPr lang="it-IT" smtClean="0"/>
               <a:t>Quinto livello</a:t>
             </a:r>
-            <a:endParaRPr lang="it-IT"/>
-          </a:p>
-        </p:txBody>
-      </p:sp>
-      <p:sp>
-        <p:nvSpPr>
-          <p:cNvPr id="5" name="Segnaposto data 4"/>
+            <a:endParaRPr kumimoji="0" lang="en-US"/>
+          </a:p>
+        </p:txBody>
+      </p:sp>
+      <p:sp>
+        <p:nvSpPr>
+          <p:cNvPr id="5" name="Date Placeholder 4"/>
           <p:cNvSpPr>
             <a:spLocks noGrp="1"/>
           </p:cNvSpPr>
@@ -1348,7 +1297,7 @@
           <a:p>
             <a:fld id="{F6B58D07-D5EF-4EAF-B81C-C86926094AFC}" type="datetimeFigureOut">
               <a:rPr lang="it-IT" smtClean="0"/>
-              <a:t>04/12/2015</a:t>
+              <a:t>05/12/2015</a:t>
             </a:fld>
             <a:endParaRPr lang="it-IT"/>
           </a:p>
@@ -1356,7 +1305,7 @@
       </p:sp>
       <p:sp>
         <p:nvSpPr>
-          <p:cNvPr id="6" name="Segnaposto piè di pagina 5"/>
+          <p:cNvPr id="6" name="Footer Placeholder 5"/>
           <p:cNvSpPr>
             <a:spLocks noGrp="1"/>
           </p:cNvSpPr>
@@ -1375,7 +1324,7 @@
       </p:sp>
       <p:sp>
         <p:nvSpPr>
-          <p:cNvPr id="7" name="Segnaposto numero diapositiva 6"/>
+          <p:cNvPr id="7" name="Slide Number Placeholder 6"/>
           <p:cNvSpPr>
             <a:spLocks noGrp="1"/>
           </p:cNvSpPr>
@@ -1397,11 +1346,6 @@
         </p:txBody>
       </p:sp>
     </p:spTree>
-    <p:extLst>
-      <p:ext uri="{BB962C8B-B14F-4D97-AF65-F5344CB8AC3E}">
-        <p14:creationId xmlns:p14="http://schemas.microsoft.com/office/powerpoint/2010/main" val="3304355547"/>
-      </p:ext>
-    </p:extLst>
   </p:cSld>
   <p:clrMapOvr>
     <a:masterClrMapping/>
@@ -1428,7 +1372,7 @@
       </p:grpSpPr>
       <p:sp>
         <p:nvSpPr>
-          <p:cNvPr id="2" name="Titolo 1"/>
+          <p:cNvPr id="2" name="Title 1"/>
           <p:cNvSpPr>
             <a:spLocks noGrp="1"/>
           </p:cNvSpPr>
@@ -1436,9 +1380,14 @@
             <p:ph type="title"/>
           </p:nvPr>
         </p:nvSpPr>
-        <p:spPr/>
-        <p:txBody>
-          <a:bodyPr/>
+        <p:spPr>
+          <a:xfrm>
+            <a:off x="457200" y="528066"/>
+            <a:ext cx="8229600" cy="857250"/>
+          </a:xfrm>
+        </p:spPr>
+        <p:txBody>
+          <a:bodyPr tIns="45720" anchor="b"/>
           <a:lstStyle>
             <a:lvl1pPr>
               <a:defRPr/>
@@ -1446,16 +1395,16 @@
           </a:lstStyle>
           <a:p>
             <a:r>
-              <a:rPr lang="it-IT" smtClean="0"/>
+              <a:rPr kumimoji="0" lang="it-IT" smtClean="0"/>
               <a:t>Fare clic per modificare lo stile del titolo</a:t>
             </a:r>
-            <a:endParaRPr lang="it-IT"/>
-          </a:p>
-        </p:txBody>
-      </p:sp>
-      <p:sp>
-        <p:nvSpPr>
-          <p:cNvPr id="3" name="Segnaposto testo 2"/>
+            <a:endParaRPr kumimoji="0" lang="en-US"/>
+          </a:p>
+        </p:txBody>
+      </p:sp>
+      <p:sp>
+        <p:nvSpPr>
+          <p:cNvPr id="3" name="Text Placeholder 2"/>
           <p:cNvSpPr>
             <a:spLocks noGrp="1"/>
           </p:cNvSpPr>
@@ -1465,54 +1414,99 @@
         </p:nvSpPr>
         <p:spPr>
           <a:xfrm>
-            <a:off x="457200" y="1151335"/>
-            <a:ext cx="4040188" cy="479822"/>
+            <a:off x="457200" y="1391436"/>
+            <a:ext cx="4040188" cy="494514"/>
           </a:xfrm>
         </p:spPr>
         <p:txBody>
-          <a:bodyPr anchor="b"/>
+          <a:bodyPr lIns="45720" tIns="0" rIns="45720" bIns="0" anchor="ctr">
+            <a:noAutofit/>
+          </a:bodyPr>
           <a:lstStyle>
             <a:lvl1pPr marL="0" indent="0">
               <a:buNone/>
-              <a:defRPr sz="2400" b="1"/>
+              <a:defRPr sz="2400" b="1" cap="none" baseline="0">
+                <a:solidFill>
+                  <a:schemeClr val="tx2"/>
+                </a:solidFill>
+                <a:effectLst/>
+              </a:defRPr>
             </a:lvl1pPr>
-            <a:lvl2pPr marL="457200" indent="0">
+            <a:lvl2pPr>
               <a:buNone/>
               <a:defRPr sz="2000" b="1"/>
             </a:lvl2pPr>
-            <a:lvl3pPr marL="914400" indent="0">
+            <a:lvl3pPr>
               <a:buNone/>
               <a:defRPr sz="1800" b="1"/>
             </a:lvl3pPr>
-            <a:lvl4pPr marL="1371600" indent="0">
+            <a:lvl4pPr>
               <a:buNone/>
               <a:defRPr sz="1600" b="1"/>
             </a:lvl4pPr>
-            <a:lvl5pPr marL="1828800" indent="0">
+            <a:lvl5pPr>
               <a:buNone/>
               <a:defRPr sz="1600" b="1"/>
             </a:lvl5pPr>
-            <a:lvl6pPr marL="2286000" indent="0">
+          </a:lstStyle>
+          <a:p>
+            <a:pPr lvl="0" eaLnBrk="1" latinLnBrk="0" hangingPunct="1"/>
+            <a:r>
+              <a:rPr kumimoji="0" lang="it-IT" smtClean="0"/>
+              <a:t>Fare clic per modificare stili del testo dello schema</a:t>
+            </a:r>
+          </a:p>
+        </p:txBody>
+      </p:sp>
+      <p:sp>
+        <p:nvSpPr>
+          <p:cNvPr id="4" name="Text Placeholder 3"/>
+          <p:cNvSpPr>
+            <a:spLocks noGrp="1"/>
+          </p:cNvSpPr>
+          <p:nvPr>
+            <p:ph type="body" sz="half" idx="3"/>
+          </p:nvPr>
+        </p:nvSpPr>
+        <p:spPr>
+          <a:xfrm>
+            <a:off x="4645026" y="1394818"/>
+            <a:ext cx="4041775" cy="491132"/>
+          </a:xfrm>
+        </p:spPr>
+        <p:txBody>
+          <a:bodyPr lIns="45720" tIns="0" rIns="45720" bIns="0" anchor="ctr"/>
+          <a:lstStyle>
+            <a:lvl1pPr marL="0" indent="0">
+              <a:buNone/>
+              <a:defRPr sz="2400" b="1" cap="none" baseline="0">
+                <a:solidFill>
+                  <a:schemeClr val="tx2"/>
+                </a:solidFill>
+                <a:effectLst/>
+              </a:defRPr>
+            </a:lvl1pPr>
+            <a:lvl2pPr>
+              <a:buNone/>
+              <a:defRPr sz="2000" b="1"/>
+            </a:lvl2pPr>
+            <a:lvl3pPr>
+              <a:buNone/>
+              <a:defRPr sz="1800" b="1"/>
+            </a:lvl3pPr>
+            <a:lvl4pPr>
               <a:buNone/>
               <a:defRPr sz="1600" b="1"/>
-            </a:lvl6pPr>
-            <a:lvl7pPr marL="2743200" indent="0">
+            </a:lvl4pPr>
+            <a:lvl5pPr>
               <a:buNone/>
               <a:defRPr sz="1600" b="1"/>
-            </a:lvl7pPr>
-            <a:lvl8pPr marL="3200400" indent="0">
-              <a:buNone/>
-              <a:defRPr sz="1600" b="1"/>
-            </a:lvl8pPr>
-            <a:lvl9pPr marL="3657600" indent="0">
-              <a:buNone/>
-              <a:defRPr sz="1600" b="1"/>
-            </a:lvl9pPr>
+            </a:lvl5pPr>
           </a:lstStyle>
           <a:p>
-            <a:pPr lvl="0"/>
-            <a:r>
-              <a:rPr lang="it-IT" smtClean="0"/>
+            <a:pPr lvl="0" eaLnBrk="1" latinLnBrk="0" hangingPunct="1"/>
+            <a:r>
+              <a:rPr kumimoji="0" lang="it-IT" smtClean="0"/>
               <a:t>Fare clic per modificare stili del testo dello schema</a:t>
             </a:r>
           </a:p>
@@ -1520,25 +1514,25 @@
       </p:sp>
       <p:sp>
         <p:nvSpPr>
-          <p:cNvPr id="4" name="Segnaposto contenuto 3"/>
-          <p:cNvSpPr>
-            <a:spLocks noGrp="1"/>
-          </p:cNvSpPr>
-          <p:nvPr>
-            <p:ph sz="half" idx="2"/>
+          <p:cNvPr id="5" name="Content Placeholder 4"/>
+          <p:cNvSpPr>
+            <a:spLocks noGrp="1"/>
+          </p:cNvSpPr>
+          <p:nvPr>
+            <p:ph sz="quarter" idx="2"/>
           </p:nvPr>
         </p:nvSpPr>
         <p:spPr>
           <a:xfrm>
-            <a:off x="457200" y="1631156"/>
-            <a:ext cx="4040188" cy="2963466"/>
+            <a:off x="457200" y="1885950"/>
+            <a:ext cx="4040188" cy="2884290"/>
           </a:xfrm>
         </p:spPr>
         <p:txBody>
-          <a:bodyPr/>
+          <a:bodyPr tIns="0"/>
           <a:lstStyle>
             <a:lvl1pPr>
-              <a:defRPr sz="2400"/>
+              <a:defRPr sz="2200"/>
             </a:lvl1pPr>
             <a:lvl2pPr>
               <a:defRPr sz="2000"/>
@@ -1552,143 +1546,66 @@
             <a:lvl5pPr>
               <a:defRPr sz="1600"/>
             </a:lvl5pPr>
-            <a:lvl6pPr>
-              <a:defRPr sz="1600"/>
-            </a:lvl6pPr>
-            <a:lvl7pPr>
-              <a:defRPr sz="1600"/>
-            </a:lvl7pPr>
-            <a:lvl8pPr>
-              <a:defRPr sz="1600"/>
-            </a:lvl8pPr>
-            <a:lvl9pPr>
-              <a:defRPr sz="1600"/>
-            </a:lvl9pPr>
           </a:lstStyle>
           <a:p>
-            <a:pPr lvl="0"/>
+            <a:pPr lvl="0" eaLnBrk="1" latinLnBrk="0" hangingPunct="1"/>
             <a:r>
               <a:rPr lang="it-IT" smtClean="0"/>
               <a:t>Fare clic per modificare stili del testo dello schema</a:t>
             </a:r>
           </a:p>
           <a:p>
-            <a:pPr lvl="1"/>
+            <a:pPr lvl="1" eaLnBrk="1" latinLnBrk="0" hangingPunct="1"/>
             <a:r>
               <a:rPr lang="it-IT" smtClean="0"/>
               <a:t>Secondo livello</a:t>
             </a:r>
           </a:p>
           <a:p>
-            <a:pPr lvl="2"/>
+            <a:pPr lvl="2" eaLnBrk="1" latinLnBrk="0" hangingPunct="1"/>
             <a:r>
               <a:rPr lang="it-IT" smtClean="0"/>
               <a:t>Terzo livello</a:t>
             </a:r>
           </a:p>
           <a:p>
-            <a:pPr lvl="3"/>
+            <a:pPr lvl="3" eaLnBrk="1" latinLnBrk="0" hangingPunct="1"/>
             <a:r>
               <a:rPr lang="it-IT" smtClean="0"/>
               <a:t>Quarto livello</a:t>
             </a:r>
           </a:p>
           <a:p>
-            <a:pPr lvl="4"/>
+            <a:pPr lvl="4" eaLnBrk="1" latinLnBrk="0" hangingPunct="1"/>
             <a:r>
               <a:rPr lang="it-IT" smtClean="0"/>
               <a:t>Quinto livello</a:t>
             </a:r>
-            <a:endParaRPr lang="it-IT"/>
-          </a:p>
-        </p:txBody>
-      </p:sp>
-      <p:sp>
-        <p:nvSpPr>
-          <p:cNvPr id="5" name="Segnaposto testo 4"/>
-          <p:cNvSpPr>
-            <a:spLocks noGrp="1"/>
-          </p:cNvSpPr>
-          <p:nvPr>
-            <p:ph type="body" sz="quarter" idx="3"/>
+            <a:endParaRPr kumimoji="0" lang="en-US"/>
+          </a:p>
+        </p:txBody>
+      </p:sp>
+      <p:sp>
+        <p:nvSpPr>
+          <p:cNvPr id="6" name="Content Placeholder 5"/>
+          <p:cNvSpPr>
+            <a:spLocks noGrp="1"/>
+          </p:cNvSpPr>
+          <p:nvPr>
+            <p:ph sz="quarter" idx="4"/>
           </p:nvPr>
         </p:nvSpPr>
         <p:spPr>
           <a:xfrm>
-            <a:off x="4645026" y="1151335"/>
-            <a:ext cx="4041775" cy="479822"/>
+            <a:off x="4645026" y="1885950"/>
+            <a:ext cx="4041775" cy="2884290"/>
           </a:xfrm>
         </p:spPr>
         <p:txBody>
-          <a:bodyPr anchor="b"/>
-          <a:lstStyle>
-            <a:lvl1pPr marL="0" indent="0">
-              <a:buNone/>
-              <a:defRPr sz="2400" b="1"/>
-            </a:lvl1pPr>
-            <a:lvl2pPr marL="457200" indent="0">
-              <a:buNone/>
-              <a:defRPr sz="2000" b="1"/>
-            </a:lvl2pPr>
-            <a:lvl3pPr marL="914400" indent="0">
-              <a:buNone/>
-              <a:defRPr sz="1800" b="1"/>
-            </a:lvl3pPr>
-            <a:lvl4pPr marL="1371600" indent="0">
-              <a:buNone/>
-              <a:defRPr sz="1600" b="1"/>
-            </a:lvl4pPr>
-            <a:lvl5pPr marL="1828800" indent="0">
-              <a:buNone/>
-              <a:defRPr sz="1600" b="1"/>
-            </a:lvl5pPr>
-            <a:lvl6pPr marL="2286000" indent="0">
-              <a:buNone/>
-              <a:defRPr sz="1600" b="1"/>
-            </a:lvl6pPr>
-            <a:lvl7pPr marL="2743200" indent="0">
-              <a:buNone/>
-              <a:defRPr sz="1600" b="1"/>
-            </a:lvl7pPr>
-            <a:lvl8pPr marL="3200400" indent="0">
-              <a:buNone/>
-              <a:defRPr sz="1600" b="1"/>
-            </a:lvl8pPr>
-            <a:lvl9pPr marL="3657600" indent="0">
-              <a:buNone/>
-              <a:defRPr sz="1600" b="1"/>
-            </a:lvl9pPr>
-          </a:lstStyle>
-          <a:p>
-            <a:pPr lvl="0"/>
-            <a:r>
-              <a:rPr lang="it-IT" smtClean="0"/>
-              <a:t>Fare clic per modificare stili del testo dello schema</a:t>
-            </a:r>
-          </a:p>
-        </p:txBody>
-      </p:sp>
-      <p:sp>
-        <p:nvSpPr>
-          <p:cNvPr id="6" name="Segnaposto contenuto 5"/>
-          <p:cNvSpPr>
-            <a:spLocks noGrp="1"/>
-          </p:cNvSpPr>
-          <p:nvPr>
-            <p:ph sz="quarter" idx="4"/>
-          </p:nvPr>
-        </p:nvSpPr>
-        <p:spPr>
-          <a:xfrm>
-            <a:off x="4645026" y="1631156"/>
-            <a:ext cx="4041775" cy="2963466"/>
-          </a:xfrm>
-        </p:spPr>
-        <p:txBody>
-          <a:bodyPr/>
+          <a:bodyPr tIns="0"/>
           <a:lstStyle>
             <a:lvl1pPr>
-              <a:defRPr sz="2400"/>
+              <a:defRPr sz="2200"/>
             </a:lvl1pPr>
             <a:lvl2pPr>
               <a:defRPr sz="2000"/>
@@ -1702,60 +1619,48 @@
             <a:lvl5pPr>
               <a:defRPr sz="1600"/>
             </a:lvl5pPr>
-            <a:lvl6pPr>
-              <a:defRPr sz="1600"/>
-            </a:lvl6pPr>
-            <a:lvl7pPr>
-              <a:defRPr sz="1600"/>
-            </a:lvl7pPr>
-            <a:lvl8pPr>
-              <a:defRPr sz="1600"/>
-            </a:lvl8pPr>
-            <a:lvl9pPr>
-              <a:defRPr sz="1600"/>
-            </a:lvl9pPr>
           </a:lstStyle>
           <a:p>
-            <a:pPr lvl="0"/>
+            <a:pPr lvl="0" eaLnBrk="1" latinLnBrk="0" hangingPunct="1"/>
             <a:r>
               <a:rPr lang="it-IT" smtClean="0"/>
               <a:t>Fare clic per modificare stili del testo dello schema</a:t>
             </a:r>
           </a:p>
           <a:p>
-            <a:pPr lvl="1"/>
+            <a:pPr lvl="1" eaLnBrk="1" latinLnBrk="0" hangingPunct="1"/>
             <a:r>
               <a:rPr lang="it-IT" smtClean="0"/>
               <a:t>Secondo livello</a:t>
             </a:r>
           </a:p>
           <a:p>
-            <a:pPr lvl="2"/>
+            <a:pPr lvl="2" eaLnBrk="1" latinLnBrk="0" hangingPunct="1"/>
             <a:r>
               <a:rPr lang="it-IT" smtClean="0"/>
               <a:t>Terzo livello</a:t>
             </a:r>
           </a:p>
           <a:p>
-            <a:pPr lvl="3"/>
+            <a:pPr lvl="3" eaLnBrk="1" latinLnBrk="0" hangingPunct="1"/>
             <a:r>
               <a:rPr lang="it-IT" smtClean="0"/>
               <a:t>Quarto livello</a:t>
             </a:r>
           </a:p>
           <a:p>
-            <a:pPr lvl="4"/>
+            <a:pPr lvl="4" eaLnBrk="1" latinLnBrk="0" hangingPunct="1"/>
             <a:r>
               <a:rPr lang="it-IT" smtClean="0"/>
               <a:t>Quinto livello</a:t>
             </a:r>
-            <a:endParaRPr lang="it-IT"/>
-          </a:p>
-        </p:txBody>
-      </p:sp>
-      <p:sp>
-        <p:nvSpPr>
-          <p:cNvPr id="7" name="Segnaposto data 6"/>
+            <a:endParaRPr kumimoji="0" lang="en-US"/>
+          </a:p>
+        </p:txBody>
+      </p:sp>
+      <p:sp>
+        <p:nvSpPr>
+          <p:cNvPr id="7" name="Date Placeholder 6"/>
           <p:cNvSpPr>
             <a:spLocks noGrp="1"/>
           </p:cNvSpPr>
@@ -1770,7 +1675,7 @@
           <a:p>
             <a:fld id="{F6B58D07-D5EF-4EAF-B81C-C86926094AFC}" type="datetimeFigureOut">
               <a:rPr lang="it-IT" smtClean="0"/>
-              <a:t>04/12/2015</a:t>
+              <a:t>05/12/2015</a:t>
             </a:fld>
             <a:endParaRPr lang="it-IT"/>
           </a:p>
@@ -1778,7 +1683,7 @@
       </p:sp>
       <p:sp>
         <p:nvSpPr>
-          <p:cNvPr id="8" name="Segnaposto piè di pagina 7"/>
+          <p:cNvPr id="8" name="Footer Placeholder 7"/>
           <p:cNvSpPr>
             <a:spLocks noGrp="1"/>
           </p:cNvSpPr>
@@ -1797,7 +1702,7 @@
       </p:sp>
       <p:sp>
         <p:nvSpPr>
-          <p:cNvPr id="9" name="Segnaposto numero diapositiva 8"/>
+          <p:cNvPr id="9" name="Slide Number Placeholder 8"/>
           <p:cNvSpPr>
             <a:spLocks noGrp="1"/>
           </p:cNvSpPr>
@@ -1819,11 +1724,6 @@
         </p:txBody>
       </p:sp>
     </p:spTree>
-    <p:extLst>
-      <p:ext uri="{BB962C8B-B14F-4D97-AF65-F5344CB8AC3E}">
-        <p14:creationId xmlns:p14="http://schemas.microsoft.com/office/powerpoint/2010/main" val="1371507421"/>
-      </p:ext>
-    </p:extLst>
   </p:cSld>
   <p:clrMapOvr>
     <a:masterClrMapping/>
@@ -1850,12 +1750,72 @@
       </p:grpSpPr>
       <p:sp>
         <p:nvSpPr>
-          <p:cNvPr id="2" name="Titolo 1"/>
+          <p:cNvPr id="2" name="Title 1"/>
           <p:cNvSpPr>
             <a:spLocks noGrp="1"/>
           </p:cNvSpPr>
           <p:nvPr>
             <p:ph type="title"/>
+          </p:nvPr>
+        </p:nvSpPr>
+        <p:spPr>
+          <a:xfrm>
+            <a:off x="457200" y="528066"/>
+            <a:ext cx="8305800" cy="857250"/>
+          </a:xfrm>
+        </p:spPr>
+        <p:txBody>
+          <a:bodyPr vert="horz" tIns="45720" bIns="0" anchor="b">
+            <a:normAutofit/>
+            <a:scene3d>
+              <a:camera prst="orthographicFront"/>
+              <a:lightRig rig="freezing" dir="t">
+                <a:rot lat="0" lon="0" rev="5640000"/>
+              </a:lightRig>
+            </a:scene3d>
+            <a:sp3d prstMaterial="flat">
+              <a:contourClr>
+                <a:schemeClr val="tx2"/>
+              </a:contourClr>
+            </a:sp3d>
+          </a:bodyPr>
+          <a:lstStyle>
+            <a:lvl1pPr algn="l" rtl="0">
+              <a:spcBef>
+                <a:spcPct val="0"/>
+              </a:spcBef>
+              <a:buNone/>
+              <a:defRPr sz="5000" b="0">
+                <a:ln>
+                  <a:noFill/>
+                </a:ln>
+                <a:solidFill>
+                  <a:schemeClr val="tx2"/>
+                </a:solidFill>
+                <a:effectLst/>
+                <a:latin typeface="+mj-lt"/>
+                <a:ea typeface="+mj-ea"/>
+                <a:cs typeface="+mj-cs"/>
+              </a:defRPr>
+            </a:lvl1pPr>
+          </a:lstStyle>
+          <a:p>
+            <a:r>
+              <a:rPr kumimoji="0" lang="it-IT" smtClean="0"/>
+              <a:t>Fare clic per modificare lo stile del titolo</a:t>
+            </a:r>
+            <a:endParaRPr kumimoji="0" lang="en-US"/>
+          </a:p>
+        </p:txBody>
+      </p:sp>
+      <p:sp>
+        <p:nvSpPr>
+          <p:cNvPr id="3" name="Date Placeholder 2"/>
+          <p:cNvSpPr>
+            <a:spLocks noGrp="1"/>
+          </p:cNvSpPr>
+          <p:nvPr>
+            <p:ph type="dt" sz="half" idx="10"/>
           </p:nvPr>
         </p:nvSpPr>
         <p:spPr/>
@@ -1863,22 +1823,22 @@
           <a:bodyPr/>
           <a:lstStyle/>
           <a:p>
-            <a:r>
+            <a:fld id="{F6B58D07-D5EF-4EAF-B81C-C86926094AFC}" type="datetimeFigureOut">
               <a:rPr lang="it-IT" smtClean="0"/>
-              <a:t>Fare clic per modificare lo stile del titolo</a:t>
-            </a:r>
+              <a:t>05/12/2015</a:t>
+            </a:fld>
             <a:endParaRPr lang="it-IT"/>
           </a:p>
         </p:txBody>
       </p:sp>
       <p:sp>
         <p:nvSpPr>
-          <p:cNvPr id="3" name="Segnaposto data 2"/>
-          <p:cNvSpPr>
-            <a:spLocks noGrp="1"/>
-          </p:cNvSpPr>
-          <p:nvPr>
-            <p:ph type="dt" sz="half" idx="10"/>
+          <p:cNvPr id="4" name="Footer Placeholder 3"/>
+          <p:cNvSpPr>
+            <a:spLocks noGrp="1"/>
+          </p:cNvSpPr>
+          <p:nvPr>
+            <p:ph type="ftr" sz="quarter" idx="11"/>
           </p:nvPr>
         </p:nvSpPr>
         <p:spPr/>
@@ -1886,36 +1846,13 @@
           <a:bodyPr/>
           <a:lstStyle/>
           <a:p>
-            <a:fld id="{F6B58D07-D5EF-4EAF-B81C-C86926094AFC}" type="datetimeFigureOut">
-              <a:rPr lang="it-IT" smtClean="0"/>
-              <a:t>04/12/2015</a:t>
-            </a:fld>
             <a:endParaRPr lang="it-IT"/>
           </a:p>
         </p:txBody>
       </p:sp>
       <p:sp>
         <p:nvSpPr>
-          <p:cNvPr id="4" name="Segnaposto piè di pagina 3"/>
-          <p:cNvSpPr>
-            <a:spLocks noGrp="1"/>
-          </p:cNvSpPr>
-          <p:nvPr>
-            <p:ph type="ftr" sz="quarter" idx="11"/>
-          </p:nvPr>
-        </p:nvSpPr>
-        <p:spPr/>
-        <p:txBody>
-          <a:bodyPr/>
-          <a:lstStyle/>
-          <a:p>
-            <a:endParaRPr lang="it-IT"/>
-          </a:p>
-        </p:txBody>
-      </p:sp>
-      <p:sp>
-        <p:nvSpPr>
-          <p:cNvPr id="5" name="Segnaposto numero diapositiva 4"/>
+          <p:cNvPr id="5" name="Slide Number Placeholder 4"/>
           <p:cNvSpPr>
             <a:spLocks noGrp="1"/>
           </p:cNvSpPr>
@@ -1937,11 +1874,6 @@
         </p:txBody>
       </p:sp>
     </p:spTree>
-    <p:extLst>
-      <p:ext uri="{BB962C8B-B14F-4D97-AF65-F5344CB8AC3E}">
-        <p14:creationId xmlns:p14="http://schemas.microsoft.com/office/powerpoint/2010/main" val="3771289404"/>
-      </p:ext>
-    </p:extLst>
   </p:cSld>
   <p:clrMapOvr>
     <a:masterClrMapping/>
@@ -1968,7 +1900,7 @@
       </p:grpSpPr>
       <p:sp>
         <p:nvSpPr>
-          <p:cNvPr id="2" name="Segnaposto data 1"/>
+          <p:cNvPr id="2" name="Date Placeholder 1"/>
           <p:cNvSpPr>
             <a:spLocks noGrp="1"/>
           </p:cNvSpPr>
@@ -1983,7 +1915,7 @@
           <a:p>
             <a:fld id="{F6B58D07-D5EF-4EAF-B81C-C86926094AFC}" type="datetimeFigureOut">
               <a:rPr lang="it-IT" smtClean="0"/>
-              <a:t>04/12/2015</a:t>
+              <a:t>05/12/2015</a:t>
             </a:fld>
             <a:endParaRPr lang="it-IT"/>
           </a:p>
@@ -1991,7 +1923,7 @@
       </p:sp>
       <p:sp>
         <p:nvSpPr>
-          <p:cNvPr id="3" name="Segnaposto piè di pagina 2"/>
+          <p:cNvPr id="3" name="Footer Placeholder 2"/>
           <p:cNvSpPr>
             <a:spLocks noGrp="1"/>
           </p:cNvSpPr>
@@ -2010,7 +1942,7 @@
       </p:sp>
       <p:sp>
         <p:nvSpPr>
-          <p:cNvPr id="4" name="Segnaposto numero diapositiva 3"/>
+          <p:cNvPr id="4" name="Slide Number Placeholder 3"/>
           <p:cNvSpPr>
             <a:spLocks noGrp="1"/>
           </p:cNvSpPr>
@@ -2032,11 +1964,6 @@
         </p:txBody>
       </p:sp>
     </p:spTree>
-    <p:extLst>
-      <p:ext uri="{BB962C8B-B14F-4D97-AF65-F5344CB8AC3E}">
-        <p14:creationId xmlns:p14="http://schemas.microsoft.com/office/powerpoint/2010/main" val="334860407"/>
-      </p:ext>
-    </p:extLst>
   </p:cSld>
   <p:clrMapOvr>
     <a:masterClrMapping/>
@@ -2063,7 +1990,7 @@
       </p:grpSpPr>
       <p:sp>
         <p:nvSpPr>
-          <p:cNvPr id="2" name="Titolo 1"/>
+          <p:cNvPr id="2" name="Title 1"/>
           <p:cNvSpPr>
             <a:spLocks noGrp="1"/>
           </p:cNvSpPr>
@@ -2073,50 +2000,116 @@
         </p:nvSpPr>
         <p:spPr>
           <a:xfrm>
-            <a:off x="457201" y="204787"/>
-            <a:ext cx="3008313" cy="871538"/>
+            <a:off x="685800" y="385764"/>
+            <a:ext cx="2743200" cy="871538"/>
           </a:xfrm>
         </p:spPr>
         <p:txBody>
-          <a:bodyPr anchor="b"/>
+          <a:bodyPr lIns="0" anchor="b">
+            <a:noAutofit/>
+          </a:bodyPr>
           <a:lstStyle>
-            <a:lvl1pPr algn="l">
-              <a:defRPr sz="2000" b="1"/>
+            <a:lvl1pPr algn="l" rtl="0">
+              <a:spcBef>
+                <a:spcPct val="0"/>
+              </a:spcBef>
+              <a:buNone/>
+              <a:defRPr sz="2600" b="0">
+                <a:ln>
+                  <a:noFill/>
+                </a:ln>
+                <a:solidFill>
+                  <a:schemeClr val="tx2"/>
+                </a:solidFill>
+                <a:effectLst/>
+                <a:latin typeface="+mj-lt"/>
+                <a:ea typeface="+mj-ea"/>
+                <a:cs typeface="+mj-cs"/>
+              </a:defRPr>
             </a:lvl1pPr>
           </a:lstStyle>
           <a:p>
             <a:r>
-              <a:rPr lang="it-IT" smtClean="0"/>
+              <a:rPr kumimoji="0" lang="it-IT" smtClean="0"/>
               <a:t>Fare clic per modificare lo stile del titolo</a:t>
             </a:r>
-            <a:endParaRPr lang="it-IT"/>
-          </a:p>
-        </p:txBody>
-      </p:sp>
-      <p:sp>
-        <p:nvSpPr>
-          <p:cNvPr id="3" name="Segnaposto contenuto 2"/>
-          <p:cNvSpPr>
-            <a:spLocks noGrp="1"/>
-          </p:cNvSpPr>
-          <p:nvPr>
-            <p:ph idx="1"/>
+            <a:endParaRPr kumimoji="0" lang="en-US"/>
+          </a:p>
+        </p:txBody>
+      </p:sp>
+      <p:sp>
+        <p:nvSpPr>
+          <p:cNvPr id="3" name="Text Placeholder 2"/>
+          <p:cNvSpPr>
+            <a:spLocks noGrp="1"/>
+          </p:cNvSpPr>
+          <p:nvPr>
+            <p:ph type="body" idx="2"/>
           </p:nvPr>
         </p:nvSpPr>
         <p:spPr>
           <a:xfrm>
-            <a:off x="3575050" y="204788"/>
-            <a:ext cx="5111750" cy="4389835"/>
+            <a:off x="685800" y="1257300"/>
+            <a:ext cx="2743200" cy="3429000"/>
           </a:xfrm>
         </p:spPr>
         <p:txBody>
-          <a:bodyPr/>
+          <a:bodyPr lIns="18288" rIns="18288"/>
+          <a:lstStyle>
+            <a:lvl1pPr marL="0" indent="0" algn="l">
+              <a:buNone/>
+              <a:defRPr sz="1400"/>
+            </a:lvl1pPr>
+            <a:lvl2pPr indent="0" algn="l">
+              <a:buNone/>
+              <a:defRPr sz="1200"/>
+            </a:lvl2pPr>
+            <a:lvl3pPr indent="0" algn="l">
+              <a:buNone/>
+              <a:defRPr sz="1000"/>
+            </a:lvl3pPr>
+            <a:lvl4pPr indent="0" algn="l">
+              <a:buNone/>
+              <a:defRPr sz="900"/>
+            </a:lvl4pPr>
+            <a:lvl5pPr indent="0" algn="l">
+              <a:buNone/>
+              <a:defRPr sz="900"/>
+            </a:lvl5pPr>
+          </a:lstStyle>
+          <a:p>
+            <a:pPr lvl="0" eaLnBrk="1" latinLnBrk="0" hangingPunct="1"/>
+            <a:r>
+              <a:rPr kumimoji="0" lang="it-IT" smtClean="0"/>
+              <a:t>Fare clic per modificare stili del testo dello schema</a:t>
+            </a:r>
+          </a:p>
+        </p:txBody>
+      </p:sp>
+      <p:sp>
+        <p:nvSpPr>
+          <p:cNvPr id="4" name="Content Placeholder 3"/>
+          <p:cNvSpPr>
+            <a:spLocks noGrp="1"/>
+          </p:cNvSpPr>
+          <p:nvPr>
+            <p:ph sz="half" idx="1"/>
+          </p:nvPr>
+        </p:nvSpPr>
+        <p:spPr>
+          <a:xfrm>
+            <a:off x="3575050" y="1257300"/>
+            <a:ext cx="5111750" cy="3429000"/>
+          </a:xfrm>
+        </p:spPr>
+        <p:txBody>
+          <a:bodyPr tIns="0"/>
           <a:lstStyle>
             <a:lvl1pPr>
-              <a:defRPr sz="3200"/>
+              <a:defRPr sz="2800"/>
             </a:lvl1pPr>
             <a:lvl2pPr>
-              <a:defRPr sz="2800"/>
+              <a:defRPr sz="2600"/>
             </a:lvl2pPr>
             <a:lvl3pPr>
               <a:defRPr sz="2400"/>
@@ -2125,127 +2118,50 @@
               <a:defRPr sz="2000"/>
             </a:lvl4pPr>
             <a:lvl5pPr>
-              <a:defRPr sz="2000"/>
+              <a:defRPr sz="1800"/>
             </a:lvl5pPr>
-            <a:lvl6pPr>
-              <a:defRPr sz="2000"/>
-            </a:lvl6pPr>
-            <a:lvl7pPr>
-              <a:defRPr sz="2000"/>
-            </a:lvl7pPr>
-            <a:lvl8pPr>
-              <a:defRPr sz="2000"/>
-            </a:lvl8pPr>
-            <a:lvl9pPr>
-              <a:defRPr sz="2000"/>
-            </a:lvl9pPr>
           </a:lstStyle>
           <a:p>
-            <a:pPr lvl="0"/>
+            <a:pPr lvl="0" eaLnBrk="1" latinLnBrk="0" hangingPunct="1"/>
             <a:r>
               <a:rPr lang="it-IT" smtClean="0"/>
               <a:t>Fare clic per modificare stili del testo dello schema</a:t>
             </a:r>
           </a:p>
           <a:p>
-            <a:pPr lvl="1"/>
+            <a:pPr lvl="1" eaLnBrk="1" latinLnBrk="0" hangingPunct="1"/>
             <a:r>
               <a:rPr lang="it-IT" smtClean="0"/>
               <a:t>Secondo livello</a:t>
             </a:r>
           </a:p>
           <a:p>
-            <a:pPr lvl="2"/>
+            <a:pPr lvl="2" eaLnBrk="1" latinLnBrk="0" hangingPunct="1"/>
             <a:r>
               <a:rPr lang="it-IT" smtClean="0"/>
               <a:t>Terzo livello</a:t>
             </a:r>
           </a:p>
           <a:p>
-            <a:pPr lvl="3"/>
+            <a:pPr lvl="3" eaLnBrk="1" latinLnBrk="0" hangingPunct="1"/>
             <a:r>
               <a:rPr lang="it-IT" smtClean="0"/>
               <a:t>Quarto livello</a:t>
             </a:r>
           </a:p>
           <a:p>
-            <a:pPr lvl="4"/>
+            <a:pPr lvl="4" eaLnBrk="1" latinLnBrk="0" hangingPunct="1"/>
             <a:r>
               <a:rPr lang="it-IT" smtClean="0"/>
               <a:t>Quinto livello</a:t>
             </a:r>
-            <a:endParaRPr lang="it-IT"/>
-          </a:p>
-        </p:txBody>
-      </p:sp>
-      <p:sp>
-        <p:nvSpPr>
-          <p:cNvPr id="4" name="Segnaposto testo 3"/>
-          <p:cNvSpPr>
-            <a:spLocks noGrp="1"/>
-          </p:cNvSpPr>
-          <p:nvPr>
-            <p:ph type="body" sz="half" idx="2"/>
-          </p:nvPr>
-        </p:nvSpPr>
-        <p:spPr>
-          <a:xfrm>
-            <a:off x="457201" y="1076326"/>
-            <a:ext cx="3008313" cy="3518297"/>
-          </a:xfrm>
-        </p:spPr>
-        <p:txBody>
-          <a:bodyPr/>
-          <a:lstStyle>
-            <a:lvl1pPr marL="0" indent="0">
-              <a:buNone/>
-              <a:defRPr sz="1400"/>
-            </a:lvl1pPr>
-            <a:lvl2pPr marL="457200" indent="0">
-              <a:buNone/>
-              <a:defRPr sz="1200"/>
-            </a:lvl2pPr>
-            <a:lvl3pPr marL="914400" indent="0">
-              <a:buNone/>
-              <a:defRPr sz="1000"/>
-            </a:lvl3pPr>
-            <a:lvl4pPr marL="1371600" indent="0">
-              <a:buNone/>
-              <a:defRPr sz="900"/>
-            </a:lvl4pPr>
-            <a:lvl5pPr marL="1828800" indent="0">
-              <a:buNone/>
-              <a:defRPr sz="900"/>
-            </a:lvl5pPr>
-            <a:lvl6pPr marL="2286000" indent="0">
-              <a:buNone/>
-              <a:defRPr sz="900"/>
-            </a:lvl6pPr>
-            <a:lvl7pPr marL="2743200" indent="0">
-              <a:buNone/>
-              <a:defRPr sz="900"/>
-            </a:lvl7pPr>
-            <a:lvl8pPr marL="3200400" indent="0">
-              <a:buNone/>
-              <a:defRPr sz="900"/>
-            </a:lvl8pPr>
-            <a:lvl9pPr marL="3657600" indent="0">
-              <a:buNone/>
-              <a:defRPr sz="900"/>
-            </a:lvl9pPr>
-          </a:lstStyle>
-          <a:p>
-            <a:pPr lvl="0"/>
-            <a:r>
-              <a:rPr lang="it-IT" smtClean="0"/>
-              <a:t>Fare clic per modificare stili del testo dello schema</a:t>
-            </a:r>
-          </a:p>
-        </p:txBody>
-      </p:sp>
-      <p:sp>
-        <p:nvSpPr>
-          <p:cNvPr id="5" name="Segnaposto data 4"/>
+            <a:endParaRPr kumimoji="0" lang="en-US"/>
+          </a:p>
+        </p:txBody>
+      </p:sp>
+      <p:sp>
+        <p:nvSpPr>
+          <p:cNvPr id="5" name="Date Placeholder 4"/>
           <p:cNvSpPr>
             <a:spLocks noGrp="1"/>
           </p:cNvSpPr>
@@ -2260,7 +2176,7 @@
           <a:p>
             <a:fld id="{F6B58D07-D5EF-4EAF-B81C-C86926094AFC}" type="datetimeFigureOut">
               <a:rPr lang="it-IT" smtClean="0"/>
-              <a:t>04/12/2015</a:t>
+              <a:t>05/12/2015</a:t>
             </a:fld>
             <a:endParaRPr lang="it-IT"/>
           </a:p>
@@ -2268,7 +2184,7 @@
       </p:sp>
       <p:sp>
         <p:nvSpPr>
-          <p:cNvPr id="6" name="Segnaposto piè di pagina 5"/>
+          <p:cNvPr id="6" name="Footer Placeholder 5"/>
           <p:cNvSpPr>
             <a:spLocks noGrp="1"/>
           </p:cNvSpPr>
@@ -2287,7 +2203,7 @@
       </p:sp>
       <p:sp>
         <p:nvSpPr>
-          <p:cNvPr id="7" name="Segnaposto numero diapositiva 6"/>
+          <p:cNvPr id="7" name="Slide Number Placeholder 6"/>
           <p:cNvSpPr>
             <a:spLocks noGrp="1"/>
           </p:cNvSpPr>
@@ -2309,11 +2225,6 @@
         </p:txBody>
       </p:sp>
     </p:spTree>
-    <p:extLst>
-      <p:ext uri="{BB962C8B-B14F-4D97-AF65-F5344CB8AC3E}">
-        <p14:creationId xmlns:p14="http://schemas.microsoft.com/office/powerpoint/2010/main" val="1764426463"/>
-      </p:ext>
-    </p:extLst>
   </p:cSld>
   <p:clrMapOvr>
     <a:masterClrMapping/>
@@ -2322,7 +2233,7 @@
 </file>
 
 <file path=ppt/slideLayouts/slideLayout9.xml><?xml version="1.0" encoding="utf-8"?>
-<p:sldLayout xmlns:a="http://schemas.openxmlformats.org/drawingml/2006/main" xmlns:r="http://schemas.openxmlformats.org/officeDocument/2006/relationships" xmlns:p="http://schemas.openxmlformats.org/presentationml/2006/main" type="picTx" preserve="1">
+<p:sldLayout xmlns:a="http://schemas.openxmlformats.org/drawingml/2006/main" xmlns:r="http://schemas.openxmlformats.org/officeDocument/2006/relationships" xmlns:p="http://schemas.openxmlformats.org/presentationml/2006/main" showMasterSp="0" type="picTx" preserve="1">
   <p:cSld name="Immagine con didascalia">
     <p:spTree>
       <p:nvGrpSpPr>
@@ -2340,7 +2251,119 @@
       </p:grpSpPr>
       <p:sp>
         <p:nvSpPr>
-          <p:cNvPr id="2" name="Titolo 1"/>
+          <p:cNvPr id="9" name="Snip and Round Single Corner Rectangle 8"/>
+          <p:cNvSpPr/>
+          <p:nvPr/>
+        </p:nvSpPr>
+        <p:spPr>
+          <a:xfrm rot="420000" flipV="1">
+            <a:off x="3165753" y="831058"/>
+            <a:ext cx="5257800" cy="3086100"/>
+          </a:xfrm>
+          <a:prstGeom prst="snipRoundRect">
+            <a:avLst>
+              <a:gd name="adj1" fmla="val 0"/>
+              <a:gd name="adj2" fmla="val 3646"/>
+            </a:avLst>
+          </a:prstGeom>
+          <a:solidFill>
+            <a:srgbClr val="FFFFFF"/>
+          </a:solidFill>
+          <a:ln w="3175" cap="rnd" cmpd="sng" algn="ctr">
+            <a:solidFill>
+              <a:srgbClr val="C0C0C0"/>
+            </a:solidFill>
+            <a:prstDash val="solid"/>
+          </a:ln>
+          <a:effectLst>
+            <a:outerShdw blurRad="63500" dist="38500" dir="7500000" sx="98500" sy="100080" kx="100000" algn="tl" rotWithShape="0">
+              <a:srgbClr val="000000">
+                <a:alpha val="25000"/>
+              </a:srgbClr>
+            </a:outerShdw>
+          </a:effectLst>
+        </p:spPr>
+        <p:style>
+          <a:lnRef idx="2">
+            <a:schemeClr val="accent1"/>
+          </a:lnRef>
+          <a:fillRef idx="1">
+            <a:schemeClr val="accent1"/>
+          </a:fillRef>
+          <a:effectRef idx="0">
+            <a:schemeClr val="accent1"/>
+          </a:effectRef>
+          <a:fontRef idx="minor">
+            <a:schemeClr val="lt1"/>
+          </a:fontRef>
+        </p:style>
+        <p:txBody>
+          <a:bodyPr rtlCol="0" anchor="ctr"/>
+          <a:lstStyle/>
+          <a:p>
+            <a:pPr algn="ctr" eaLnBrk="1" latinLnBrk="0" hangingPunct="1"/>
+            <a:endParaRPr kumimoji="0" lang="en-US"/>
+          </a:p>
+        </p:txBody>
+      </p:sp>
+      <p:sp>
+        <p:nvSpPr>
+          <p:cNvPr id="12" name="Right Triangle 11"/>
+          <p:cNvSpPr/>
+          <p:nvPr/>
+        </p:nvSpPr>
+        <p:spPr>
+          <a:xfrm rot="420000" flipV="1">
+            <a:off x="8004134" y="4019827"/>
+            <a:ext cx="155448" cy="116586"/>
+          </a:xfrm>
+          <a:prstGeom prst="rtTriangle">
+            <a:avLst/>
+          </a:prstGeom>
+          <a:solidFill>
+            <a:srgbClr val="FFFFFF"/>
+          </a:solidFill>
+          <a:ln w="12700" cap="flat" cmpd="sng" algn="ctr">
+            <a:solidFill>
+              <a:srgbClr val="FFFFFF"/>
+            </a:solidFill>
+            <a:prstDash val="solid"/>
+            <a:bevel/>
+          </a:ln>
+          <a:effectLst>
+            <a:outerShdw blurRad="19685" dist="6350" dir="12900000" algn="tl" rotWithShape="0">
+              <a:srgbClr val="000000">
+                <a:alpha val="47000"/>
+              </a:srgbClr>
+            </a:outerShdw>
+          </a:effectLst>
+        </p:spPr>
+        <p:style>
+          <a:lnRef idx="2">
+            <a:schemeClr val="accent1"/>
+          </a:lnRef>
+          <a:fillRef idx="1">
+            <a:schemeClr val="accent1"/>
+          </a:fillRef>
+          <a:effectRef idx="0">
+            <a:schemeClr val="accent1"/>
+          </a:effectRef>
+          <a:fontRef idx="minor">
+            <a:schemeClr val="lt1"/>
+          </a:fontRef>
+        </p:style>
+        <p:txBody>
+          <a:bodyPr rtlCol="0" anchor="ctr"/>
+          <a:lstStyle/>
+          <a:p>
+            <a:pPr algn="ctr" eaLnBrk="1" latinLnBrk="0" hangingPunct="1"/>
+            <a:endParaRPr kumimoji="0" lang="en-US"/>
+          </a:p>
+        </p:txBody>
+      </p:sp>
+      <p:sp>
+        <p:nvSpPr>
+          <p:cNvPr id="2" name="Title 1"/>
           <p:cNvSpPr>
             <a:spLocks noGrp="1"/>
           </p:cNvSpPr>
@@ -2350,41 +2373,178 @@
         </p:nvSpPr>
         <p:spPr>
           <a:xfrm>
-            <a:off x="1792288" y="3600450"/>
-            <a:ext cx="5486400" cy="425054"/>
+            <a:off x="609600" y="882747"/>
+            <a:ext cx="2212848" cy="1186966"/>
           </a:xfrm>
         </p:spPr>
         <p:txBody>
-          <a:bodyPr anchor="b"/>
+          <a:bodyPr vert="horz" lIns="45720" tIns="45720" rIns="45720" bIns="45720" anchor="b"/>
           <a:lstStyle>
             <a:lvl1pPr algn="l">
-              <a:defRPr sz="2000" b="1"/>
+              <a:buNone/>
+              <a:defRPr sz="2000" b="1">
+                <a:solidFill>
+                  <a:schemeClr val="tx2"/>
+                </a:solidFill>
+              </a:defRPr>
             </a:lvl1pPr>
           </a:lstStyle>
           <a:p>
             <a:r>
-              <a:rPr lang="it-IT" smtClean="0"/>
+              <a:rPr kumimoji="0" lang="it-IT" smtClean="0"/>
               <a:t>Fare clic per modificare lo stile del titolo</a:t>
             </a:r>
-            <a:endParaRPr lang="it-IT"/>
-          </a:p>
-        </p:txBody>
-      </p:sp>
-      <p:sp>
-        <p:nvSpPr>
-          <p:cNvPr id="3" name="Segnaposto immagine 2"/>
-          <p:cNvSpPr>
-            <a:spLocks noGrp="1"/>
-          </p:cNvSpPr>
-          <p:nvPr>
-            <p:ph type="pic" idx="1"/>
+            <a:endParaRPr kumimoji="0" lang="en-US"/>
+          </a:p>
+        </p:txBody>
+      </p:sp>
+      <p:sp>
+        <p:nvSpPr>
+          <p:cNvPr id="4" name="Text Placeholder 3"/>
+          <p:cNvSpPr>
+            <a:spLocks noGrp="1"/>
+          </p:cNvSpPr>
+          <p:nvPr>
+            <p:ph type="body" sz="half" idx="2"/>
           </p:nvPr>
         </p:nvSpPr>
         <p:spPr>
           <a:xfrm>
-            <a:off x="1792288" y="459581"/>
-            <a:ext cx="5486400" cy="3086100"/>
+            <a:off x="609600" y="2121589"/>
+            <a:ext cx="2209800" cy="1634490"/>
           </a:xfrm>
+        </p:spPr>
+        <p:txBody>
+          <a:bodyPr lIns="64008" rIns="45720" bIns="45720" anchor="t"/>
+          <a:lstStyle>
+            <a:lvl1pPr marL="0" indent="0" algn="l">
+              <a:spcBef>
+                <a:spcPts val="250"/>
+              </a:spcBef>
+              <a:buFontTx/>
+              <a:buNone/>
+              <a:defRPr sz="1300"/>
+            </a:lvl1pPr>
+            <a:lvl2pPr>
+              <a:defRPr sz="1200"/>
+            </a:lvl2pPr>
+            <a:lvl3pPr>
+              <a:defRPr sz="1000"/>
+            </a:lvl3pPr>
+            <a:lvl4pPr>
+              <a:defRPr sz="900"/>
+            </a:lvl4pPr>
+            <a:lvl5pPr>
+              <a:defRPr sz="900"/>
+            </a:lvl5pPr>
+          </a:lstStyle>
+          <a:p>
+            <a:pPr lvl="0" eaLnBrk="1" latinLnBrk="0" hangingPunct="1"/>
+            <a:r>
+              <a:rPr kumimoji="0" lang="it-IT" smtClean="0"/>
+              <a:t>Fare clic per modificare stili del testo dello schema</a:t>
+            </a:r>
+          </a:p>
+        </p:txBody>
+      </p:sp>
+      <p:sp>
+        <p:nvSpPr>
+          <p:cNvPr id="5" name="Date Placeholder 4"/>
+          <p:cNvSpPr>
+            <a:spLocks noGrp="1"/>
+          </p:cNvSpPr>
+          <p:nvPr>
+            <p:ph type="dt" sz="half" idx="10"/>
+          </p:nvPr>
+        </p:nvSpPr>
+        <p:spPr/>
+        <p:txBody>
+          <a:bodyPr/>
+          <a:lstStyle/>
+          <a:p>
+            <a:fld id="{F6B58D07-D5EF-4EAF-B81C-C86926094AFC}" type="datetimeFigureOut">
+              <a:rPr lang="it-IT" smtClean="0"/>
+              <a:t>05/12/2015</a:t>
+            </a:fld>
+            <a:endParaRPr lang="it-IT"/>
+          </a:p>
+        </p:txBody>
+      </p:sp>
+      <p:sp>
+        <p:nvSpPr>
+          <p:cNvPr id="6" name="Footer Placeholder 5"/>
+          <p:cNvSpPr>
+            <a:spLocks noGrp="1"/>
+          </p:cNvSpPr>
+          <p:nvPr>
+            <p:ph type="ftr" sz="quarter" idx="11"/>
+          </p:nvPr>
+        </p:nvSpPr>
+        <p:spPr/>
+        <p:txBody>
+          <a:bodyPr/>
+          <a:lstStyle/>
+          <a:p>
+            <a:endParaRPr lang="it-IT"/>
+          </a:p>
+        </p:txBody>
+      </p:sp>
+      <p:sp>
+        <p:nvSpPr>
+          <p:cNvPr id="7" name="Slide Number Placeholder 6"/>
+          <p:cNvSpPr>
+            <a:spLocks noGrp="1"/>
+          </p:cNvSpPr>
+          <p:nvPr>
+            <p:ph type="sldNum" sz="quarter" idx="12"/>
+          </p:nvPr>
+        </p:nvSpPr>
+        <p:spPr>
+          <a:xfrm>
+            <a:off x="8077200" y="4767263"/>
+            <a:ext cx="609600" cy="273844"/>
+          </a:xfrm>
+        </p:spPr>
+        <p:txBody>
+          <a:bodyPr/>
+          <a:lstStyle/>
+          <a:p>
+            <a:fld id="{BB527BF2-64BD-4C11-A8C5-672C2A12D1DD}" type="slidenum">
+              <a:rPr lang="it-IT" smtClean="0"/>
+              <a:t>‹N›</a:t>
+            </a:fld>
+            <a:endParaRPr lang="it-IT"/>
+          </a:p>
+        </p:txBody>
+      </p:sp>
+      <p:sp>
+        <p:nvSpPr>
+          <p:cNvPr id="3" name="Picture Placeholder 2"/>
+          <p:cNvSpPr>
+            <a:spLocks noGrp="1"/>
+          </p:cNvSpPr>
+          <p:nvPr>
+            <p:ph type="pic" idx="1"/>
+          </p:nvPr>
+        </p:nvSpPr>
+        <p:spPr>
+          <a:xfrm rot="420000">
+            <a:off x="3485793" y="899638"/>
+            <a:ext cx="4617720" cy="2948940"/>
+          </a:xfrm>
+          <a:prstGeom prst="rect">
+            <a:avLst/>
+          </a:prstGeom>
+          <a:solidFill>
+            <a:schemeClr val="bg2"/>
+          </a:solidFill>
+          <a:ln w="3000" cap="rnd">
+            <a:solidFill>
+              <a:srgbClr val="C0C0C0"/>
+            </a:solidFill>
+            <a:round/>
+          </a:ln>
+          <a:effectLst/>
         </p:spPr>
         <p:txBody>
           <a:bodyPr/>
@@ -2393,180 +2553,273 @@
               <a:buNone/>
               <a:defRPr sz="3200"/>
             </a:lvl1pPr>
-            <a:lvl2pPr marL="457200" indent="0">
-              <a:buNone/>
-              <a:defRPr sz="2800"/>
-            </a:lvl2pPr>
-            <a:lvl3pPr marL="914400" indent="0">
-              <a:buNone/>
-              <a:defRPr sz="2400"/>
-            </a:lvl3pPr>
-            <a:lvl4pPr marL="1371600" indent="0">
-              <a:buNone/>
-              <a:defRPr sz="2000"/>
-            </a:lvl4pPr>
-            <a:lvl5pPr marL="1828800" indent="0">
-              <a:buNone/>
-              <a:defRPr sz="2000"/>
-            </a:lvl5pPr>
-            <a:lvl6pPr marL="2286000" indent="0">
-              <a:buNone/>
-              <a:defRPr sz="2000"/>
-            </a:lvl6pPr>
-            <a:lvl7pPr marL="2743200" indent="0">
-              <a:buNone/>
-              <a:defRPr sz="2000"/>
-            </a:lvl7pPr>
-            <a:lvl8pPr marL="3200400" indent="0">
-              <a:buNone/>
-              <a:defRPr sz="2000"/>
-            </a:lvl8pPr>
-            <a:lvl9pPr marL="3657600" indent="0">
-              <a:buNone/>
-              <a:defRPr sz="2000"/>
-            </a:lvl9pPr>
           </a:lstStyle>
           <a:p>
-            <a:endParaRPr lang="it-IT"/>
-          </a:p>
-        </p:txBody>
-      </p:sp>
-      <p:sp>
-        <p:nvSpPr>
-          <p:cNvPr id="4" name="Segnaposto testo 3"/>
-          <p:cNvSpPr>
-            <a:spLocks noGrp="1"/>
-          </p:cNvSpPr>
-          <p:nvPr>
-            <p:ph type="body" sz="half" idx="2"/>
-          </p:nvPr>
-        </p:nvSpPr>
-        <p:spPr>
-          <a:xfrm>
-            <a:off x="1792288" y="4025503"/>
-            <a:ext cx="5486400" cy="603647"/>
+            <a:r>
+              <a:rPr kumimoji="0" lang="it-IT" smtClean="0"/>
+              <a:t>Fare clic sull'icona per inserire un'immagine</a:t>
+            </a:r>
+            <a:endParaRPr kumimoji="0" lang="en-US" dirty="0"/>
+          </a:p>
+        </p:txBody>
+      </p:sp>
+      <p:sp>
+        <p:nvSpPr>
+          <p:cNvPr id="10" name="Freeform 9"/>
+          <p:cNvSpPr>
+            <a:spLocks/>
+          </p:cNvSpPr>
+          <p:nvPr/>
+        </p:nvSpPr>
+        <p:spPr bwMode="auto">
+          <a:xfrm flipV="1">
+            <a:off x="-9525" y="4362450"/>
+            <a:ext cx="9163050" cy="781050"/>
           </a:xfrm>
+          <a:custGeom>
+            <a:avLst>
+              <a:gd name="A1" fmla="val 0"/>
+              <a:gd name="A2" fmla="val 0"/>
+              <a:gd name="A3" fmla="val 0"/>
+              <a:gd name="A4" fmla="val 0"/>
+              <a:gd name="A5" fmla="val 0"/>
+              <a:gd name="A6" fmla="val 0"/>
+              <a:gd name="A7" fmla="val 0"/>
+              <a:gd name="A8" fmla="val 0"/>
+            </a:avLst>
+            <a:gdLst/>
+            <a:ahLst/>
+            <a:cxnLst>
+              <a:cxn ang="0">
+                <a:pos x="6" y="2"/>
+              </a:cxn>
+              <a:cxn ang="0">
+                <a:pos x="2542" y="0"/>
+              </a:cxn>
+              <a:cxn ang="0">
+                <a:pos x="4374" y="367"/>
+              </a:cxn>
+              <a:cxn ang="0">
+                <a:pos x="5766" y="55"/>
+              </a:cxn>
+              <a:cxn ang="0">
+                <a:pos x="5772" y="213"/>
+              </a:cxn>
+              <a:cxn ang="0">
+                <a:pos x="4302" y="439"/>
+              </a:cxn>
+              <a:cxn ang="0">
+                <a:pos x="1488" y="201"/>
+              </a:cxn>
+              <a:cxn ang="0">
+                <a:pos x="0" y="656"/>
+              </a:cxn>
+              <a:cxn ang="0">
+                <a:pos x="6" y="2"/>
+              </a:cxn>
+            </a:cxnLst>
+            <a:rect l="0" t="0" r="0" b="0"/>
+            <a:pathLst>
+              <a:path w="5772" h="656">
+                <a:moveTo>
+                  <a:pt x="6" y="2"/>
+                </a:moveTo>
+                <a:lnTo>
+                  <a:pt x="2542" y="0"/>
+                </a:lnTo>
+                <a:cubicBezTo>
+                  <a:pt x="2746" y="101"/>
+                  <a:pt x="3828" y="367"/>
+                  <a:pt x="4374" y="367"/>
+                </a:cubicBezTo>
+                <a:cubicBezTo>
+                  <a:pt x="4920" y="367"/>
+                  <a:pt x="5526" y="152"/>
+                  <a:pt x="5766" y="55"/>
+                </a:cubicBezTo>
+                <a:lnTo>
+                  <a:pt x="5772" y="213"/>
+                </a:lnTo>
+                <a:cubicBezTo>
+                  <a:pt x="5670" y="257"/>
+                  <a:pt x="5016" y="441"/>
+                  <a:pt x="4302" y="439"/>
+                </a:cubicBezTo>
+                <a:cubicBezTo>
+                  <a:pt x="3588" y="437"/>
+                  <a:pt x="2205" y="165"/>
+                  <a:pt x="1488" y="201"/>
+                </a:cubicBezTo>
+                <a:cubicBezTo>
+                  <a:pt x="750" y="209"/>
+                  <a:pt x="270" y="482"/>
+                  <a:pt x="0" y="656"/>
+                </a:cubicBezTo>
+                <a:lnTo>
+                  <a:pt x="6" y="2"/>
+                </a:lnTo>
+                <a:close/>
+              </a:path>
+            </a:pathLst>
+          </a:custGeom>
+          <a:gradFill>
+            <a:gsLst>
+              <a:gs pos="0">
+                <a:schemeClr val="accent2">
+                  <a:shade val="50000"/>
+                  <a:alpha val="45000"/>
+                  <a:satMod val="120000"/>
+                </a:schemeClr>
+              </a:gs>
+              <a:gs pos="100000">
+                <a:schemeClr val="accent3">
+                  <a:shade val="80000"/>
+                  <a:alpha val="55000"/>
+                  <a:satMod val="155000"/>
+                </a:schemeClr>
+              </a:gs>
+            </a:gsLst>
+            <a:lin ang="5400000" scaled="1"/>
+          </a:gradFill>
+          <a:ln w="9525" cap="flat" cmpd="sng" algn="ctr">
+            <a:noFill/>
+            <a:prstDash val="solid"/>
+            <a:round/>
+            <a:headEnd type="none" w="med" len="med"/>
+            <a:tailEnd type="none" w="med" len="med"/>
+          </a:ln>
+          <a:effectLst/>
         </p:spPr>
         <p:txBody>
-          <a:bodyPr/>
-          <a:lstStyle>
-            <a:lvl1pPr marL="0" indent="0">
-              <a:buNone/>
-              <a:defRPr sz="1400"/>
-            </a:lvl1pPr>
-            <a:lvl2pPr marL="457200" indent="0">
-              <a:buNone/>
-              <a:defRPr sz="1200"/>
-            </a:lvl2pPr>
-            <a:lvl3pPr marL="914400" indent="0">
-              <a:buNone/>
-              <a:defRPr sz="1000"/>
-            </a:lvl3pPr>
-            <a:lvl4pPr marL="1371600" indent="0">
-              <a:buNone/>
-              <a:defRPr sz="900"/>
-            </a:lvl4pPr>
-            <a:lvl5pPr marL="1828800" indent="0">
-              <a:buNone/>
-              <a:defRPr sz="900"/>
-            </a:lvl5pPr>
-            <a:lvl6pPr marL="2286000" indent="0">
-              <a:buNone/>
-              <a:defRPr sz="900"/>
-            </a:lvl6pPr>
-            <a:lvl7pPr marL="2743200" indent="0">
-              <a:buNone/>
-              <a:defRPr sz="900"/>
-            </a:lvl7pPr>
-            <a:lvl8pPr marL="3200400" indent="0">
-              <a:buNone/>
-              <a:defRPr sz="900"/>
-            </a:lvl8pPr>
-            <a:lvl9pPr marL="3657600" indent="0">
-              <a:buNone/>
-              <a:defRPr sz="900"/>
-            </a:lvl9pPr>
-          </a:lstStyle>
-          <a:p>
-            <a:pPr lvl="0"/>
-            <a:r>
-              <a:rPr lang="it-IT" smtClean="0"/>
-              <a:t>Fare clic per modificare stili del testo dello schema</a:t>
-            </a:r>
-          </a:p>
-        </p:txBody>
-      </p:sp>
-      <p:sp>
-        <p:nvSpPr>
-          <p:cNvPr id="5" name="Segnaposto data 4"/>
-          <p:cNvSpPr>
-            <a:spLocks noGrp="1"/>
-          </p:cNvSpPr>
-          <p:nvPr>
-            <p:ph type="dt" sz="half" idx="10"/>
-          </p:nvPr>
-        </p:nvSpPr>
-        <p:spPr/>
-        <p:txBody>
-          <a:bodyPr/>
+          <a:bodyPr vert="horz" wrap="square" lIns="91440" tIns="45720" rIns="91440" bIns="45720" anchor="t" compatLnSpc="1"/>
           <a:lstStyle/>
           <a:p>
-            <a:fld id="{F6B58D07-D5EF-4EAF-B81C-C86926094AFC}" type="datetimeFigureOut">
-              <a:rPr lang="it-IT" smtClean="0"/>
-              <a:t>04/12/2015</a:t>
-            </a:fld>
-            <a:endParaRPr lang="it-IT"/>
-          </a:p>
-        </p:txBody>
-      </p:sp>
-      <p:sp>
-        <p:nvSpPr>
-          <p:cNvPr id="6" name="Segnaposto piè di pagina 5"/>
-          <p:cNvSpPr>
-            <a:spLocks noGrp="1"/>
-          </p:cNvSpPr>
-          <p:nvPr>
-            <p:ph type="ftr" sz="quarter" idx="11"/>
-          </p:nvPr>
-        </p:nvSpPr>
-        <p:spPr/>
-        <p:txBody>
-          <a:bodyPr/>
+            <a:pPr marL="0" algn="l" rtl="0" eaLnBrk="1" latinLnBrk="0" hangingPunct="1"/>
+            <a:endParaRPr kumimoji="0" lang="en-US">
+              <a:solidFill>
+                <a:schemeClr val="tx1"/>
+              </a:solidFill>
+              <a:latin typeface="+mn-lt"/>
+              <a:ea typeface="+mn-ea"/>
+              <a:cs typeface="+mn-cs"/>
+            </a:endParaRPr>
+          </a:p>
+        </p:txBody>
+      </p:sp>
+      <p:sp>
+        <p:nvSpPr>
+          <p:cNvPr id="11" name="Freeform 10"/>
+          <p:cNvSpPr>
+            <a:spLocks/>
+          </p:cNvSpPr>
+          <p:nvPr/>
+        </p:nvSpPr>
+        <p:spPr bwMode="auto">
+          <a:xfrm flipV="1">
+            <a:off x="4381500" y="4664869"/>
+            <a:ext cx="4762500" cy="478631"/>
+          </a:xfrm>
+          <a:custGeom>
+            <a:avLst>
+              <a:gd name="A1" fmla="val 0"/>
+              <a:gd name="A2" fmla="val 0"/>
+              <a:gd name="A3" fmla="val 0"/>
+              <a:gd name="A4" fmla="val 0"/>
+              <a:gd name="A5" fmla="val 0"/>
+              <a:gd name="A6" fmla="val 0"/>
+              <a:gd name="A7" fmla="val 0"/>
+              <a:gd name="A8" fmla="val 0"/>
+            </a:avLst>
+            <a:gdLst/>
+            <a:ahLst/>
+            <a:cxnLst>
+              <a:cxn ang="0">
+                <a:pos x="0" y="0"/>
+              </a:cxn>
+              <a:cxn ang="0">
+                <a:pos x="1668" y="564"/>
+              </a:cxn>
+              <a:cxn ang="0">
+                <a:pos x="3000" y="186"/>
+              </a:cxn>
+              <a:cxn ang="0">
+                <a:pos x="3000" y="6"/>
+              </a:cxn>
+              <a:cxn ang="0">
+                <a:pos x="0" y="0"/>
+              </a:cxn>
+            </a:cxnLst>
+            <a:rect l="0" t="0" r="0" b="0"/>
+            <a:pathLst>
+              <a:path w="3000" h="595">
+                <a:moveTo>
+                  <a:pt x="0" y="0"/>
+                </a:moveTo>
+                <a:cubicBezTo>
+                  <a:pt x="174" y="102"/>
+                  <a:pt x="1168" y="533"/>
+                  <a:pt x="1668" y="564"/>
+                </a:cubicBezTo>
+                <a:cubicBezTo>
+                  <a:pt x="2168" y="595"/>
+                  <a:pt x="2778" y="279"/>
+                  <a:pt x="3000" y="186"/>
+                </a:cubicBezTo>
+                <a:lnTo>
+                  <a:pt x="3000" y="6"/>
+                </a:lnTo>
+                <a:lnTo>
+                  <a:pt x="0" y="0"/>
+                </a:lnTo>
+                <a:close/>
+              </a:path>
+            </a:pathLst>
+          </a:custGeom>
+          <a:gradFill>
+            <a:gsLst>
+              <a:gs pos="0">
+                <a:schemeClr val="accent3">
+                  <a:shade val="50000"/>
+                  <a:alpha val="30000"/>
+                  <a:satMod val="130000"/>
+                </a:schemeClr>
+              </a:gs>
+              <a:gs pos="80000">
+                <a:schemeClr val="accent2">
+                  <a:shade val="75000"/>
+                  <a:alpha val="45000"/>
+                  <a:satMod val="140000"/>
+                </a:schemeClr>
+              </a:gs>
+            </a:gsLst>
+            <a:lin ang="5400000" scaled="1"/>
+          </a:gradFill>
+          <a:ln w="9525" cap="flat" cmpd="sng" algn="ctr">
+            <a:noFill/>
+            <a:prstDash val="solid"/>
+            <a:round/>
+            <a:headEnd type="none" w="med" len="med"/>
+            <a:tailEnd type="none" w="med" len="med"/>
+          </a:ln>
+          <a:effectLst/>
+        </p:spPr>
+        <p:txBody>
+          <a:bodyPr vert="horz" wrap="square" lIns="91440" tIns="45720" rIns="91440" bIns="45720" anchor="t" compatLnSpc="1"/>
           <a:lstStyle/>
           <a:p>
-            <a:endParaRPr lang="it-IT"/>
-          </a:p>
-        </p:txBody>
-      </p:sp>
-      <p:sp>
-        <p:nvSpPr>
-          <p:cNvPr id="7" name="Segnaposto numero diapositiva 6"/>
-          <p:cNvSpPr>
-            <a:spLocks noGrp="1"/>
-          </p:cNvSpPr>
-          <p:nvPr>
-            <p:ph type="sldNum" sz="quarter" idx="12"/>
-          </p:nvPr>
-        </p:nvSpPr>
-        <p:spPr/>
-        <p:txBody>
-          <a:bodyPr/>
-          <a:lstStyle/>
-          <a:p>
-            <a:fld id="{BB527BF2-64BD-4C11-A8C5-672C2A12D1DD}" type="slidenum">
-              <a:rPr lang="it-IT" smtClean="0"/>
-              <a:t>‹N›</a:t>
-            </a:fld>
-            <a:endParaRPr lang="it-IT"/>
+            <a:pPr marL="0" algn="l" rtl="0" eaLnBrk="1" latinLnBrk="0" hangingPunct="1"/>
+            <a:endParaRPr kumimoji="0" lang="en-US">
+              <a:solidFill>
+                <a:schemeClr val="tx1"/>
+              </a:solidFill>
+              <a:latin typeface="+mn-lt"/>
+              <a:ea typeface="+mn-ea"/>
+              <a:cs typeface="+mn-cs"/>
+            </a:endParaRPr>
           </a:p>
         </p:txBody>
       </p:sp>
     </p:spTree>
-    <p:extLst>
-      <p:ext uri="{BB962C8B-B14F-4D97-AF65-F5344CB8AC3E}">
-        <p14:creationId xmlns:p14="http://schemas.microsoft.com/office/powerpoint/2010/main" val="2808334140"/>
-      </p:ext>
-    </p:extLst>
   </p:cSld>
   <p:clrMapOvr>
     <a:masterClrMapping/>
@@ -2578,7 +2831,7 @@
 <p:sldMaster xmlns:a="http://schemas.openxmlformats.org/drawingml/2006/main" xmlns:r="http://schemas.openxmlformats.org/officeDocument/2006/relationships" xmlns:p="http://schemas.openxmlformats.org/presentationml/2006/main">
   <p:cSld>
     <p:bg>
-      <p:bgRef idx="1001">
+      <p:bgRef idx="1003">
         <a:schemeClr val="bg1"/>
       </p:bgRef>
     </p:bg>
@@ -2598,7 +2851,263 @@
       </p:grpSpPr>
       <p:sp>
         <p:nvSpPr>
-          <p:cNvPr id="2" name="Segnaposto titolo 1"/>
+          <p:cNvPr id="7" name="Freeform 6"/>
+          <p:cNvSpPr>
+            <a:spLocks/>
+          </p:cNvSpPr>
+          <p:nvPr/>
+        </p:nvSpPr>
+        <p:spPr bwMode="auto">
+          <a:xfrm>
+            <a:off x="-9525" y="-5358"/>
+            <a:ext cx="9163050" cy="781050"/>
+          </a:xfrm>
+          <a:custGeom>
+            <a:avLst>
+              <a:gd name="A1" fmla="val 0"/>
+              <a:gd name="A2" fmla="val 0"/>
+              <a:gd name="A3" fmla="val 0"/>
+              <a:gd name="A4" fmla="val 0"/>
+              <a:gd name="A5" fmla="val 0"/>
+              <a:gd name="A6" fmla="val 0"/>
+              <a:gd name="A7" fmla="val 0"/>
+              <a:gd name="A8" fmla="val 0"/>
+            </a:avLst>
+            <a:gdLst/>
+            <a:ahLst/>
+            <a:cxnLst>
+              <a:cxn ang="0">
+                <a:pos x="6" y="2"/>
+              </a:cxn>
+              <a:cxn ang="0">
+                <a:pos x="2542" y="0"/>
+              </a:cxn>
+              <a:cxn ang="0">
+                <a:pos x="4374" y="367"/>
+              </a:cxn>
+              <a:cxn ang="0">
+                <a:pos x="5766" y="55"/>
+              </a:cxn>
+              <a:cxn ang="0">
+                <a:pos x="5772" y="213"/>
+              </a:cxn>
+              <a:cxn ang="0">
+                <a:pos x="4302" y="439"/>
+              </a:cxn>
+              <a:cxn ang="0">
+                <a:pos x="1488" y="201"/>
+              </a:cxn>
+              <a:cxn ang="0">
+                <a:pos x="0" y="656"/>
+              </a:cxn>
+              <a:cxn ang="0">
+                <a:pos x="6" y="2"/>
+              </a:cxn>
+            </a:cxnLst>
+            <a:rect l="0" t="0" r="0" b="0"/>
+            <a:pathLst>
+              <a:path w="5772" h="656">
+                <a:moveTo>
+                  <a:pt x="6" y="2"/>
+                </a:moveTo>
+                <a:lnTo>
+                  <a:pt x="2542" y="0"/>
+                </a:lnTo>
+                <a:cubicBezTo>
+                  <a:pt x="2746" y="101"/>
+                  <a:pt x="3828" y="367"/>
+                  <a:pt x="4374" y="367"/>
+                </a:cubicBezTo>
+                <a:cubicBezTo>
+                  <a:pt x="4920" y="367"/>
+                  <a:pt x="5526" y="152"/>
+                  <a:pt x="5766" y="55"/>
+                </a:cubicBezTo>
+                <a:lnTo>
+                  <a:pt x="5772" y="213"/>
+                </a:lnTo>
+                <a:cubicBezTo>
+                  <a:pt x="5670" y="257"/>
+                  <a:pt x="5016" y="441"/>
+                  <a:pt x="4302" y="439"/>
+                </a:cubicBezTo>
+                <a:cubicBezTo>
+                  <a:pt x="3588" y="437"/>
+                  <a:pt x="2205" y="165"/>
+                  <a:pt x="1488" y="201"/>
+                </a:cubicBezTo>
+                <a:cubicBezTo>
+                  <a:pt x="750" y="209"/>
+                  <a:pt x="270" y="482"/>
+                  <a:pt x="0" y="656"/>
+                </a:cubicBezTo>
+                <a:lnTo>
+                  <a:pt x="6" y="2"/>
+                </a:lnTo>
+                <a:close/>
+              </a:path>
+            </a:pathLst>
+          </a:custGeom>
+          <a:gradFill>
+            <a:gsLst>
+              <a:gs pos="0">
+                <a:schemeClr val="accent2">
+                  <a:shade val="50000"/>
+                  <a:alpha val="45000"/>
+                  <a:satMod val="120000"/>
+                </a:schemeClr>
+              </a:gs>
+              <a:gs pos="100000">
+                <a:schemeClr val="accent3">
+                  <a:shade val="80000"/>
+                  <a:alpha val="55000"/>
+                  <a:satMod val="155000"/>
+                </a:schemeClr>
+              </a:gs>
+            </a:gsLst>
+            <a:lin ang="5400000" scaled="1"/>
+          </a:gradFill>
+          <a:ln w="9525" cap="flat" cmpd="sng" algn="ctr">
+            <a:noFill/>
+            <a:prstDash val="solid"/>
+            <a:round/>
+            <a:headEnd type="none" w="med" len="med"/>
+            <a:tailEnd type="none" w="med" len="med"/>
+          </a:ln>
+          <a:effectLst/>
+        </p:spPr>
+        <p:txBody>
+          <a:bodyPr vert="horz" wrap="square" lIns="91440" tIns="45720" rIns="91440" bIns="45720" anchor="t" compatLnSpc="1"/>
+          <a:lstStyle/>
+          <a:p>
+            <a:pPr marL="0" algn="l" rtl="0" eaLnBrk="1" latinLnBrk="0" hangingPunct="1"/>
+            <a:endParaRPr kumimoji="0" lang="en-US">
+              <a:solidFill>
+                <a:schemeClr val="tx1"/>
+              </a:solidFill>
+              <a:latin typeface="+mn-lt"/>
+              <a:ea typeface="+mn-ea"/>
+              <a:cs typeface="+mn-cs"/>
+            </a:endParaRPr>
+          </a:p>
+        </p:txBody>
+      </p:sp>
+      <p:sp>
+        <p:nvSpPr>
+          <p:cNvPr id="8" name="Freeform 7"/>
+          <p:cNvSpPr>
+            <a:spLocks/>
+          </p:cNvSpPr>
+          <p:nvPr/>
+        </p:nvSpPr>
+        <p:spPr bwMode="auto">
+          <a:xfrm>
+            <a:off x="4381500" y="-5358"/>
+            <a:ext cx="4762500" cy="478631"/>
+          </a:xfrm>
+          <a:custGeom>
+            <a:avLst>
+              <a:gd name="A1" fmla="val 0"/>
+              <a:gd name="A2" fmla="val 0"/>
+              <a:gd name="A3" fmla="val 0"/>
+              <a:gd name="A4" fmla="val 0"/>
+              <a:gd name="A5" fmla="val 0"/>
+              <a:gd name="A6" fmla="val 0"/>
+              <a:gd name="A7" fmla="val 0"/>
+              <a:gd name="A8" fmla="val 0"/>
+            </a:avLst>
+            <a:gdLst/>
+            <a:ahLst/>
+            <a:cxnLst>
+              <a:cxn ang="0">
+                <a:pos x="0" y="0"/>
+              </a:cxn>
+              <a:cxn ang="0">
+                <a:pos x="1668" y="564"/>
+              </a:cxn>
+              <a:cxn ang="0">
+                <a:pos x="3000" y="186"/>
+              </a:cxn>
+              <a:cxn ang="0">
+                <a:pos x="3000" y="6"/>
+              </a:cxn>
+              <a:cxn ang="0">
+                <a:pos x="0" y="0"/>
+              </a:cxn>
+            </a:cxnLst>
+            <a:rect l="0" t="0" r="0" b="0"/>
+            <a:pathLst>
+              <a:path w="3000" h="595">
+                <a:moveTo>
+                  <a:pt x="0" y="0"/>
+                </a:moveTo>
+                <a:cubicBezTo>
+                  <a:pt x="174" y="102"/>
+                  <a:pt x="1168" y="533"/>
+                  <a:pt x="1668" y="564"/>
+                </a:cubicBezTo>
+                <a:cubicBezTo>
+                  <a:pt x="2168" y="595"/>
+                  <a:pt x="2778" y="279"/>
+                  <a:pt x="3000" y="186"/>
+                </a:cubicBezTo>
+                <a:lnTo>
+                  <a:pt x="3000" y="6"/>
+                </a:lnTo>
+                <a:lnTo>
+                  <a:pt x="0" y="0"/>
+                </a:lnTo>
+                <a:close/>
+              </a:path>
+            </a:pathLst>
+          </a:custGeom>
+          <a:gradFill>
+            <a:gsLst>
+              <a:gs pos="0">
+                <a:schemeClr val="accent3">
+                  <a:shade val="50000"/>
+                  <a:alpha val="30000"/>
+                  <a:satMod val="130000"/>
+                </a:schemeClr>
+              </a:gs>
+              <a:gs pos="80000">
+                <a:schemeClr val="accent2">
+                  <a:shade val="75000"/>
+                  <a:alpha val="45000"/>
+                  <a:satMod val="140000"/>
+                </a:schemeClr>
+              </a:gs>
+            </a:gsLst>
+            <a:lin ang="5400000" scaled="1"/>
+          </a:gradFill>
+          <a:ln w="9525" cap="flat" cmpd="sng" algn="ctr">
+            <a:noFill/>
+            <a:prstDash val="solid"/>
+            <a:round/>
+            <a:headEnd type="none" w="med" len="med"/>
+            <a:tailEnd type="none" w="med" len="med"/>
+          </a:ln>
+          <a:effectLst/>
+        </p:spPr>
+        <p:txBody>
+          <a:bodyPr vert="horz" wrap="square" lIns="91440" tIns="45720" rIns="91440" bIns="45720" anchor="t" compatLnSpc="1"/>
+          <a:lstStyle/>
+          <a:p>
+            <a:pPr marL="0" algn="l" rtl="0" eaLnBrk="1" latinLnBrk="0" hangingPunct="1"/>
+            <a:endParaRPr kumimoji="0" lang="en-US">
+              <a:solidFill>
+                <a:schemeClr val="tx1"/>
+              </a:solidFill>
+              <a:latin typeface="+mn-lt"/>
+              <a:ea typeface="+mn-ea"/>
+              <a:cs typeface="+mn-cs"/>
+            </a:endParaRPr>
+          </a:p>
+        </p:txBody>
+      </p:sp>
+      <p:sp>
+        <p:nvSpPr>
+          <p:cNvPr id="9" name="Title Placeholder 8"/>
           <p:cNvSpPr>
             <a:spLocks noGrp="1"/>
           </p:cNvSpPr>
@@ -2608,7 +3117,7 @@
         </p:nvSpPr>
         <p:spPr>
           <a:xfrm>
-            <a:off x="457200" y="205979"/>
+            <a:off x="457200" y="528066"/>
             <a:ext cx="8229600" cy="857250"/>
           </a:xfrm>
           <a:prstGeom prst="rect">
@@ -2616,22 +3125,22 @@
           </a:prstGeom>
         </p:spPr>
         <p:txBody>
-          <a:bodyPr vert="horz" lIns="91440" tIns="45720" rIns="91440" bIns="45720" rtlCol="0" anchor="ctr">
+          <a:bodyPr vert="horz" lIns="0" rIns="0" bIns="0" anchor="b">
             <a:normAutofit/>
           </a:bodyPr>
           <a:lstStyle/>
           <a:p>
             <a:r>
-              <a:rPr lang="it-IT" smtClean="0"/>
+              <a:rPr kumimoji="0" lang="it-IT" smtClean="0"/>
               <a:t>Fare clic per modificare lo stile del titolo</a:t>
             </a:r>
-            <a:endParaRPr lang="it-IT"/>
-          </a:p>
-        </p:txBody>
-      </p:sp>
-      <p:sp>
-        <p:nvSpPr>
-          <p:cNvPr id="3" name="Segnaposto testo 2"/>
+            <a:endParaRPr kumimoji="0" lang="en-US"/>
+          </a:p>
+        </p:txBody>
+      </p:sp>
+      <p:sp>
+        <p:nvSpPr>
+          <p:cNvPr id="30" name="Text Placeholder 29"/>
           <p:cNvSpPr>
             <a:spLocks noGrp="1"/>
           </p:cNvSpPr>
@@ -2641,59 +3150,59 @@
         </p:nvSpPr>
         <p:spPr>
           <a:xfrm>
-            <a:off x="457200" y="1200151"/>
-            <a:ext cx="8229600" cy="3394472"/>
+            <a:off x="457200" y="1451610"/>
+            <a:ext cx="8229600" cy="3291840"/>
           </a:xfrm>
           <a:prstGeom prst="rect">
             <a:avLst/>
           </a:prstGeom>
         </p:spPr>
         <p:txBody>
-          <a:bodyPr vert="horz" lIns="91440" tIns="45720" rIns="91440" bIns="45720" rtlCol="0">
+          <a:bodyPr vert="horz">
             <a:normAutofit/>
           </a:bodyPr>
           <a:lstStyle/>
           <a:p>
-            <a:pPr lvl="0"/>
-            <a:r>
-              <a:rPr lang="it-IT" smtClean="0"/>
+            <a:pPr lvl="0" eaLnBrk="1" latinLnBrk="0" hangingPunct="1"/>
+            <a:r>
+              <a:rPr kumimoji="0" lang="it-IT" smtClean="0"/>
               <a:t>Fare clic per modificare stili del testo dello schema</a:t>
             </a:r>
           </a:p>
           <a:p>
-            <a:pPr lvl="1"/>
-            <a:r>
-              <a:rPr lang="it-IT" smtClean="0"/>
+            <a:pPr lvl="1" eaLnBrk="1" latinLnBrk="0" hangingPunct="1"/>
+            <a:r>
+              <a:rPr kumimoji="0" lang="it-IT" smtClean="0"/>
               <a:t>Secondo livello</a:t>
             </a:r>
           </a:p>
           <a:p>
-            <a:pPr lvl="2"/>
-            <a:r>
-              <a:rPr lang="it-IT" smtClean="0"/>
+            <a:pPr lvl="2" eaLnBrk="1" latinLnBrk="0" hangingPunct="1"/>
+            <a:r>
+              <a:rPr kumimoji="0" lang="it-IT" smtClean="0"/>
               <a:t>Terzo livello</a:t>
             </a:r>
           </a:p>
           <a:p>
-            <a:pPr lvl="3"/>
-            <a:r>
-              <a:rPr lang="it-IT" smtClean="0"/>
+            <a:pPr lvl="3" eaLnBrk="1" latinLnBrk="0" hangingPunct="1"/>
+            <a:r>
+              <a:rPr kumimoji="0" lang="it-IT" smtClean="0"/>
               <a:t>Quarto livello</a:t>
             </a:r>
           </a:p>
           <a:p>
-            <a:pPr lvl="4"/>
-            <a:r>
-              <a:rPr lang="it-IT" smtClean="0"/>
+            <a:pPr lvl="4" eaLnBrk="1" latinLnBrk="0" hangingPunct="1"/>
+            <a:r>
+              <a:rPr kumimoji="0" lang="it-IT" smtClean="0"/>
               <a:t>Quinto livello</a:t>
             </a:r>
-            <a:endParaRPr lang="it-IT"/>
-          </a:p>
-        </p:txBody>
-      </p:sp>
-      <p:sp>
-        <p:nvSpPr>
-          <p:cNvPr id="4" name="Segnaposto data 3"/>
+            <a:endParaRPr kumimoji="0" lang="en-US"/>
+          </a:p>
+        </p:txBody>
+      </p:sp>
+      <p:sp>
+        <p:nvSpPr>
+          <p:cNvPr id="10" name="Date Placeholder 9"/>
           <p:cNvSpPr>
             <a:spLocks noGrp="1"/>
           </p:cNvSpPr>
@@ -2711,13 +3220,13 @@
           </a:prstGeom>
         </p:spPr>
         <p:txBody>
-          <a:bodyPr vert="horz" lIns="91440" tIns="45720" rIns="91440" bIns="45720" rtlCol="0" anchor="ctr"/>
+          <a:bodyPr vert="horz" lIns="0" tIns="0" rIns="0" bIns="0" anchor="b"/>
           <a:lstStyle>
-            <a:lvl1pPr algn="l">
-              <a:defRPr sz="1200">
+            <a:lvl1pPr algn="l" eaLnBrk="1" latinLnBrk="0" hangingPunct="1">
+              <a:defRPr kumimoji="0" sz="1200">
                 <a:solidFill>
-                  <a:schemeClr val="tx1">
-                    <a:tint val="75000"/>
+                  <a:schemeClr val="tx2">
+                    <a:shade val="90000"/>
                   </a:schemeClr>
                 </a:solidFill>
               </a:defRPr>
@@ -2726,7 +3235,7 @@
           <a:p>
             <a:fld id="{F6B58D07-D5EF-4EAF-B81C-C86926094AFC}" type="datetimeFigureOut">
               <a:rPr lang="it-IT" smtClean="0"/>
-              <a:t>04/12/2015</a:t>
+              <a:t>05/12/2015</a:t>
             </a:fld>
             <a:endParaRPr lang="it-IT"/>
           </a:p>
@@ -2734,7 +3243,7 @@
       </p:sp>
       <p:sp>
         <p:nvSpPr>
-          <p:cNvPr id="5" name="Segnaposto piè di pagina 4"/>
+          <p:cNvPr id="22" name="Footer Placeholder 21"/>
           <p:cNvSpPr>
             <a:spLocks noGrp="1"/>
           </p:cNvSpPr>
@@ -2744,21 +3253,21 @@
         </p:nvSpPr>
         <p:spPr>
           <a:xfrm>
-            <a:off x="3124200" y="4767263"/>
-            <a:ext cx="2895600" cy="273844"/>
+            <a:off x="2667000" y="4767263"/>
+            <a:ext cx="3352800" cy="273844"/>
           </a:xfrm>
           <a:prstGeom prst="rect">
             <a:avLst/>
           </a:prstGeom>
         </p:spPr>
         <p:txBody>
-          <a:bodyPr vert="horz" lIns="91440" tIns="45720" rIns="91440" bIns="45720" rtlCol="0" anchor="ctr"/>
+          <a:bodyPr vert="horz" lIns="0" tIns="0" rIns="0" bIns="0" anchor="b"/>
           <a:lstStyle>
-            <a:lvl1pPr algn="ctr">
-              <a:defRPr sz="1200">
+            <a:lvl1pPr algn="l" eaLnBrk="1" latinLnBrk="0" hangingPunct="1">
+              <a:defRPr kumimoji="0" sz="1200">
                 <a:solidFill>
-                  <a:schemeClr val="tx1">
-                    <a:tint val="75000"/>
+                  <a:schemeClr val="tx2">
+                    <a:shade val="90000"/>
                   </a:schemeClr>
                 </a:solidFill>
               </a:defRPr>
@@ -2771,7 +3280,7 @@
       </p:sp>
       <p:sp>
         <p:nvSpPr>
-          <p:cNvPr id="6" name="Segnaposto numero diapositiva 5"/>
+          <p:cNvPr id="18" name="Slide Number Placeholder 17"/>
           <p:cNvSpPr>
             <a:spLocks noGrp="1"/>
           </p:cNvSpPr>
@@ -2781,21 +3290,21 @@
         </p:nvSpPr>
         <p:spPr>
           <a:xfrm>
-            <a:off x="6553200" y="4767263"/>
-            <a:ext cx="2133600" cy="273844"/>
+            <a:off x="7924800" y="4767263"/>
+            <a:ext cx="762000" cy="273844"/>
           </a:xfrm>
           <a:prstGeom prst="rect">
             <a:avLst/>
           </a:prstGeom>
         </p:spPr>
         <p:txBody>
-          <a:bodyPr vert="horz" lIns="91440" tIns="45720" rIns="91440" bIns="45720" rtlCol="0" anchor="ctr"/>
+          <a:bodyPr vert="horz" lIns="0" tIns="0" rIns="0" bIns="0" anchor="b"/>
           <a:lstStyle>
-            <a:lvl1pPr algn="r">
-              <a:defRPr sz="1200">
+            <a:lvl1pPr algn="r" eaLnBrk="1" latinLnBrk="0" hangingPunct="1">
+              <a:defRPr kumimoji="0" sz="1200">
                 <a:solidFill>
-                  <a:schemeClr val="tx1">
-                    <a:tint val="75000"/>
+                  <a:schemeClr val="tx2">
+                    <a:shade val="90000"/>
                   </a:schemeClr>
                 </a:solidFill>
               </a:defRPr>
@@ -2810,38 +3319,251 @@
           </a:p>
         </p:txBody>
       </p:sp>
+      <p:grpSp>
+        <p:nvGrpSpPr>
+          <p:cNvPr id="2" name="Group 1"/>
+          <p:cNvGrpSpPr/>
+          <p:nvPr/>
+        </p:nvGrpSpPr>
+        <p:grpSpPr>
+          <a:xfrm>
+            <a:off x="-19017" y="151806"/>
+            <a:ext cx="9180548" cy="486918"/>
+            <a:chOff x="-19045" y="216550"/>
+            <a:chExt cx="9180548" cy="649224"/>
+          </a:xfrm>
+        </p:grpSpPr>
+        <p:sp>
+          <p:nvSpPr>
+            <p:cNvPr id="12" name="Freeform 11"/>
+            <p:cNvSpPr>
+              <a:spLocks/>
+            </p:cNvSpPr>
+            <p:nvPr/>
+          </p:nvSpPr>
+          <p:spPr bwMode="auto">
+            <a:xfrm rot="21435692">
+              <a:off x="-19045" y="216550"/>
+              <a:ext cx="9163050" cy="649224"/>
+            </a:xfrm>
+            <a:custGeom>
+              <a:avLst>
+                <a:gd name="A1" fmla="val 0"/>
+                <a:gd name="A2" fmla="val 0"/>
+                <a:gd name="A3" fmla="val 0"/>
+                <a:gd name="A4" fmla="val 0"/>
+                <a:gd name="A5" fmla="val 0"/>
+                <a:gd name="A6" fmla="val 0"/>
+                <a:gd name="A7" fmla="val 0"/>
+                <a:gd name="A8" fmla="val 0"/>
+              </a:avLst>
+              <a:gdLst/>
+              <a:ahLst/>
+              <a:cxnLst>
+                <a:cxn ang="0">
+                  <a:pos x="0" y="966"/>
+                </a:cxn>
+                <a:cxn ang="0">
+                  <a:pos x="1608" y="282"/>
+                </a:cxn>
+                <a:cxn ang="0">
+                  <a:pos x="4110" y="1008"/>
+                </a:cxn>
+                <a:cxn ang="0">
+                  <a:pos x="5772" y="0"/>
+                </a:cxn>
+              </a:cxnLst>
+              <a:rect l="0" t="0" r="0" b="0"/>
+              <a:pathLst>
+                <a:path w="5772" h="1055">
+                  <a:moveTo>
+                    <a:pt x="0" y="966"/>
+                  </a:moveTo>
+                  <a:cubicBezTo>
+                    <a:pt x="282" y="738"/>
+                    <a:pt x="923" y="275"/>
+                    <a:pt x="1608" y="282"/>
+                  </a:cubicBezTo>
+                  <a:cubicBezTo>
+                    <a:pt x="2293" y="289"/>
+                    <a:pt x="3416" y="1055"/>
+                    <a:pt x="4110" y="1008"/>
+                  </a:cubicBezTo>
+                  <a:cubicBezTo>
+                    <a:pt x="4804" y="961"/>
+                    <a:pt x="5426" y="210"/>
+                    <a:pt x="5772" y="0"/>
+                  </a:cubicBezTo>
+                </a:path>
+              </a:pathLst>
+            </a:custGeom>
+            <a:noFill/>
+            <a:ln w="10795" cap="flat" cmpd="sng" algn="ctr">
+              <a:gradFill>
+                <a:gsLst>
+                  <a:gs pos="74000">
+                    <a:schemeClr val="accent3">
+                      <a:shade val="75000"/>
+                    </a:schemeClr>
+                  </a:gs>
+                  <a:gs pos="86000">
+                    <a:schemeClr val="tx1">
+                      <a:alpha val="29000"/>
+                    </a:schemeClr>
+                  </a:gs>
+                  <a:gs pos="16000">
+                    <a:schemeClr val="accent2">
+                      <a:shade val="75000"/>
+                      <a:alpha val="56000"/>
+                    </a:schemeClr>
+                  </a:gs>
+                </a:gsLst>
+                <a:lin ang="5400000" scaled="1"/>
+              </a:gradFill>
+              <a:prstDash val="solid"/>
+              <a:round/>
+              <a:headEnd type="none" w="med" len="med"/>
+              <a:tailEnd type="none" w="med" len="med"/>
+            </a:ln>
+            <a:effectLst/>
+          </p:spPr>
+          <p:txBody>
+            <a:bodyPr vert="horz" wrap="square" lIns="91440" tIns="45720" rIns="91440" bIns="45720" anchor="t" compatLnSpc="1"/>
+            <a:lstStyle/>
+            <a:p>
+              <a:endParaRPr kumimoji="0" lang="en-US"/>
+            </a:p>
+          </p:txBody>
+        </p:sp>
+        <p:sp>
+          <p:nvSpPr>
+            <p:cNvPr id="13" name="Freeform 12"/>
+            <p:cNvSpPr>
+              <a:spLocks/>
+            </p:cNvSpPr>
+            <p:nvPr/>
+          </p:nvSpPr>
+          <p:spPr bwMode="auto">
+            <a:xfrm rot="21435692">
+              <a:off x="-14309" y="290003"/>
+              <a:ext cx="9175812" cy="530352"/>
+            </a:xfrm>
+            <a:custGeom>
+              <a:avLst>
+                <a:gd name="A1" fmla="val 0"/>
+                <a:gd name="A2" fmla="val 0"/>
+                <a:gd name="A3" fmla="val 0"/>
+                <a:gd name="A4" fmla="val 0"/>
+                <a:gd name="A5" fmla="val 0"/>
+                <a:gd name="A6" fmla="val 0"/>
+                <a:gd name="A7" fmla="val 0"/>
+                <a:gd name="A8" fmla="val 0"/>
+              </a:avLst>
+              <a:gdLst/>
+              <a:ahLst/>
+              <a:cxnLst>
+                <a:cxn ang="0">
+                  <a:pos x="0" y="732"/>
+                </a:cxn>
+                <a:cxn ang="0">
+                  <a:pos x="1638" y="228"/>
+                </a:cxn>
+                <a:cxn ang="0">
+                  <a:pos x="4122" y="816"/>
+                </a:cxn>
+                <a:cxn ang="0">
+                  <a:pos x="5766" y="0"/>
+                </a:cxn>
+              </a:cxnLst>
+              <a:rect l="0" t="0" r="0" b="0"/>
+              <a:pathLst>
+                <a:path w="5766" h="854">
+                  <a:moveTo>
+                    <a:pt x="0" y="732"/>
+                  </a:moveTo>
+                  <a:cubicBezTo>
+                    <a:pt x="273" y="647"/>
+                    <a:pt x="951" y="214"/>
+                    <a:pt x="1638" y="228"/>
+                  </a:cubicBezTo>
+                  <a:cubicBezTo>
+                    <a:pt x="2325" y="242"/>
+                    <a:pt x="3434" y="854"/>
+                    <a:pt x="4122" y="816"/>
+                  </a:cubicBezTo>
+                  <a:cubicBezTo>
+                    <a:pt x="4810" y="778"/>
+                    <a:pt x="5424" y="170"/>
+                    <a:pt x="5766" y="0"/>
+                  </a:cubicBezTo>
+                </a:path>
+              </a:pathLst>
+            </a:custGeom>
+            <a:noFill/>
+            <a:ln w="9525" cap="flat" cmpd="sng" algn="ctr">
+              <a:gradFill>
+                <a:gsLst>
+                  <a:gs pos="74000">
+                    <a:schemeClr val="accent4"/>
+                  </a:gs>
+                  <a:gs pos="44000">
+                    <a:schemeClr val="accent1"/>
+                  </a:gs>
+                  <a:gs pos="33000">
+                    <a:schemeClr val="accent2">
+                      <a:alpha val="56000"/>
+                    </a:schemeClr>
+                  </a:gs>
+                </a:gsLst>
+                <a:lin ang="5400000" scaled="1"/>
+              </a:gradFill>
+              <a:prstDash val="solid"/>
+              <a:round/>
+              <a:headEnd type="none" w="med" len="med"/>
+              <a:tailEnd type="none" w="med" len="med"/>
+            </a:ln>
+            <a:effectLst/>
+          </p:spPr>
+          <p:txBody>
+            <a:bodyPr vert="horz" wrap="square" lIns="91440" tIns="45720" rIns="91440" bIns="45720" anchor="t" compatLnSpc="1"/>
+            <a:lstStyle/>
+            <a:p>
+              <a:endParaRPr kumimoji="0" lang="en-US"/>
+            </a:p>
+          </p:txBody>
+        </p:sp>
+      </p:grpSp>
     </p:spTree>
-    <p:extLst>
-      <p:ext uri="{BB962C8B-B14F-4D97-AF65-F5344CB8AC3E}">
-        <p14:creationId xmlns:p14="http://schemas.microsoft.com/office/powerpoint/2010/main" val="3383425163"/>
-      </p:ext>
-    </p:extLst>
   </p:cSld>
   <p:clrMap bg1="lt1" tx1="dk1" bg2="lt2" tx2="dk2" accent1="accent1" accent2="accent2" accent3="accent3" accent4="accent4" accent5="accent5" accent6="accent6" hlink="hlink" folHlink="folHlink"/>
   <p:sldLayoutIdLst>
-    <p:sldLayoutId id="2147483649" r:id="rId1"/>
-    <p:sldLayoutId id="2147483650" r:id="rId2"/>
-    <p:sldLayoutId id="2147483651" r:id="rId3"/>
-    <p:sldLayoutId id="2147483652" r:id="rId4"/>
-    <p:sldLayoutId id="2147483653" r:id="rId5"/>
-    <p:sldLayoutId id="2147483654" r:id="rId6"/>
-    <p:sldLayoutId id="2147483655" r:id="rId7"/>
-    <p:sldLayoutId id="2147483656" r:id="rId8"/>
-    <p:sldLayoutId id="2147483657" r:id="rId9"/>
-    <p:sldLayoutId id="2147483658" r:id="rId10"/>
-    <p:sldLayoutId id="2147483659" r:id="rId11"/>
+    <p:sldLayoutId id="2147483661" r:id="rId1"/>
+    <p:sldLayoutId id="2147483662" r:id="rId2"/>
+    <p:sldLayoutId id="2147483663" r:id="rId3"/>
+    <p:sldLayoutId id="2147483664" r:id="rId4"/>
+    <p:sldLayoutId id="2147483665" r:id="rId5"/>
+    <p:sldLayoutId id="2147483666" r:id="rId6"/>
+    <p:sldLayoutId id="2147483667" r:id="rId7"/>
+    <p:sldLayoutId id="2147483668" r:id="rId8"/>
+    <p:sldLayoutId id="2147483669" r:id="rId9"/>
+    <p:sldLayoutId id="2147483670" r:id="rId10"/>
+    <p:sldLayoutId id="2147483671" r:id="rId11"/>
   </p:sldLayoutIdLst>
   <p:txStyles>
     <p:titleStyle>
-      <a:lvl1pPr algn="ctr" defTabSz="914400" rtl="0" eaLnBrk="1" latinLnBrk="0" hangingPunct="1">
+      <a:lvl1pPr algn="l" rtl="0" eaLnBrk="1" latinLnBrk="0" hangingPunct="1">
         <a:spcBef>
           <a:spcPct val="0"/>
         </a:spcBef>
         <a:buNone/>
-        <a:defRPr sz="4400" kern="1200">
+        <a:defRPr kumimoji="0" sz="5000" b="0" kern="1200">
+          <a:ln>
+            <a:noFill/>
+          </a:ln>
           <a:solidFill>
-            <a:schemeClr val="tx1"/>
+            <a:schemeClr val="tx2"/>
           </a:solidFill>
+          <a:effectLst/>
           <a:latin typeface="+mj-lt"/>
           <a:ea typeface="+mj-ea"/>
           <a:cs typeface="+mj-cs"/>
@@ -2849,13 +3571,17 @@
       </a:lvl1pPr>
     </p:titleStyle>
     <p:bodyStyle>
-      <a:lvl1pPr marL="342900" indent="-342900" algn="l" defTabSz="914400" rtl="0" eaLnBrk="1" latinLnBrk="0" hangingPunct="1">
+      <a:lvl1pPr marL="274320" indent="-274320" algn="l" rtl="0" eaLnBrk="1" latinLnBrk="0" hangingPunct="1">
         <a:spcBef>
           <a:spcPct val="20000"/>
         </a:spcBef>
-        <a:buFont typeface="Arial" panose="020B0604020202020204" pitchFamily="34" charset="0"/>
-        <a:buChar char="•"/>
-        <a:defRPr sz="3200" kern="1200">
+        <a:buClr>
+          <a:schemeClr val="accent3"/>
+        </a:buClr>
+        <a:buSzPct val="95000"/>
+        <a:buFont typeface="Wingdings 2"/>
+        <a:buChar char=""/>
+        <a:defRPr kumimoji="0" sz="2600" kern="1200">
           <a:solidFill>
             <a:schemeClr val="tx1"/>
           </a:solidFill>
@@ -2864,13 +3590,17 @@
           <a:cs typeface="+mn-cs"/>
         </a:defRPr>
       </a:lvl1pPr>
-      <a:lvl2pPr marL="742950" indent="-285750" algn="l" defTabSz="914400" rtl="0" eaLnBrk="1" latinLnBrk="0" hangingPunct="1">
+      <a:lvl2pPr marL="640080" indent="-246888" algn="l" rtl="0" eaLnBrk="1" latinLnBrk="0" hangingPunct="1">
         <a:spcBef>
           <a:spcPct val="20000"/>
         </a:spcBef>
-        <a:buFont typeface="Arial" panose="020B0604020202020204" pitchFamily="34" charset="0"/>
-        <a:buChar char="–"/>
-        <a:defRPr sz="2800" kern="1200">
+        <a:buClr>
+          <a:schemeClr val="accent1"/>
+        </a:buClr>
+        <a:buSzPct val="85000"/>
+        <a:buFont typeface="Wingdings 2"/>
+        <a:buChar char=""/>
+        <a:defRPr kumimoji="0" sz="2400" kern="1200">
           <a:solidFill>
             <a:schemeClr val="tx1"/>
           </a:solidFill>
@@ -2879,13 +3609,17 @@
           <a:cs typeface="+mn-cs"/>
         </a:defRPr>
       </a:lvl2pPr>
-      <a:lvl3pPr marL="1143000" indent="-228600" algn="l" defTabSz="914400" rtl="0" eaLnBrk="1" latinLnBrk="0" hangingPunct="1">
+      <a:lvl3pPr marL="914400" indent="-246888" algn="l" rtl="0" eaLnBrk="1" latinLnBrk="0" hangingPunct="1">
         <a:spcBef>
           <a:spcPct val="20000"/>
         </a:spcBef>
-        <a:buFont typeface="Arial" panose="020B0604020202020204" pitchFamily="34" charset="0"/>
-        <a:buChar char="•"/>
-        <a:defRPr sz="2400" kern="1200">
+        <a:buClr>
+          <a:schemeClr val="accent2"/>
+        </a:buClr>
+        <a:buSzPct val="70000"/>
+        <a:buFont typeface="Wingdings 2"/>
+        <a:buChar char=""/>
+        <a:defRPr kumimoji="0" sz="2100" kern="1200">
           <a:solidFill>
             <a:schemeClr val="tx1"/>
           </a:solidFill>
@@ -2894,13 +3628,17 @@
           <a:cs typeface="+mn-cs"/>
         </a:defRPr>
       </a:lvl3pPr>
-      <a:lvl4pPr marL="1600200" indent="-228600" algn="l" defTabSz="914400" rtl="0" eaLnBrk="1" latinLnBrk="0" hangingPunct="1">
+      <a:lvl4pPr marL="1188720" indent="-210312" algn="l" rtl="0" eaLnBrk="1" latinLnBrk="0" hangingPunct="1">
         <a:spcBef>
           <a:spcPct val="20000"/>
         </a:spcBef>
-        <a:buFont typeface="Arial" panose="020B0604020202020204" pitchFamily="34" charset="0"/>
-        <a:buChar char="–"/>
-        <a:defRPr sz="2000" kern="1200">
+        <a:buClr>
+          <a:schemeClr val="accent3"/>
+        </a:buClr>
+        <a:buSzPct val="65000"/>
+        <a:buFont typeface="Wingdings 2"/>
+        <a:buChar char=""/>
+        <a:defRPr kumimoji="0" sz="2000" kern="1200">
           <a:solidFill>
             <a:schemeClr val="tx1"/>
           </a:solidFill>
@@ -2909,13 +3647,17 @@
           <a:cs typeface="+mn-cs"/>
         </a:defRPr>
       </a:lvl4pPr>
-      <a:lvl5pPr marL="2057400" indent="-228600" algn="l" defTabSz="914400" rtl="0" eaLnBrk="1" latinLnBrk="0" hangingPunct="1">
+      <a:lvl5pPr marL="1463040" indent="-210312" algn="l" rtl="0" eaLnBrk="1" latinLnBrk="0" hangingPunct="1">
         <a:spcBef>
           <a:spcPct val="20000"/>
         </a:spcBef>
-        <a:buFont typeface="Arial" panose="020B0604020202020204" pitchFamily="34" charset="0"/>
-        <a:buChar char="»"/>
-        <a:defRPr sz="2000" kern="1200">
+        <a:buClr>
+          <a:schemeClr val="accent4"/>
+        </a:buClr>
+        <a:buSzPct val="65000"/>
+        <a:buFont typeface="Wingdings 2"/>
+        <a:buChar char=""/>
+        <a:defRPr kumimoji="0" sz="2000" kern="1200">
           <a:solidFill>
             <a:schemeClr val="tx1"/>
           </a:solidFill>
@@ -2924,13 +3666,17 @@
           <a:cs typeface="+mn-cs"/>
         </a:defRPr>
       </a:lvl5pPr>
-      <a:lvl6pPr marL="2514600" indent="-228600" algn="l" defTabSz="914400" rtl="0" eaLnBrk="1" latinLnBrk="0" hangingPunct="1">
+      <a:lvl6pPr marL="1737360" indent="-210312" algn="l" rtl="0" eaLnBrk="1" latinLnBrk="0" hangingPunct="1">
         <a:spcBef>
           <a:spcPct val="20000"/>
         </a:spcBef>
-        <a:buFont typeface="Arial" panose="020B0604020202020204" pitchFamily="34" charset="0"/>
-        <a:buChar char="•"/>
-        <a:defRPr sz="2000" kern="1200">
+        <a:buClr>
+          <a:schemeClr val="accent5"/>
+        </a:buClr>
+        <a:buSzPct val="80000"/>
+        <a:buFont typeface="Wingdings 2"/>
+        <a:buChar char=""/>
+        <a:defRPr kumimoji="0" sz="1800" kern="1200">
           <a:solidFill>
             <a:schemeClr val="tx1"/>
           </a:solidFill>
@@ -2939,13 +3685,17 @@
           <a:cs typeface="+mn-cs"/>
         </a:defRPr>
       </a:lvl6pPr>
-      <a:lvl7pPr marL="2971800" indent="-228600" algn="l" defTabSz="914400" rtl="0" eaLnBrk="1" latinLnBrk="0" hangingPunct="1">
+      <a:lvl7pPr marL="1920240" indent="-182880" algn="l" rtl="0" eaLnBrk="1" latinLnBrk="0" hangingPunct="1">
         <a:spcBef>
           <a:spcPct val="20000"/>
         </a:spcBef>
-        <a:buFont typeface="Arial" panose="020B0604020202020204" pitchFamily="34" charset="0"/>
-        <a:buChar char="•"/>
-        <a:defRPr sz="2000" kern="1200">
+        <a:buClr>
+          <a:schemeClr val="accent6"/>
+        </a:buClr>
+        <a:buSzPct val="80000"/>
+        <a:buFont typeface="Wingdings 2"/>
+        <a:buChar char=""/>
+        <a:defRPr kumimoji="0" sz="1600" kern="1200" baseline="0">
           <a:solidFill>
             <a:schemeClr val="tx1"/>
           </a:solidFill>
@@ -2954,13 +3704,15 @@
           <a:cs typeface="+mn-cs"/>
         </a:defRPr>
       </a:lvl7pPr>
-      <a:lvl8pPr marL="3429000" indent="-228600" algn="l" defTabSz="914400" rtl="0" eaLnBrk="1" latinLnBrk="0" hangingPunct="1">
+      <a:lvl8pPr marL="2194560" indent="-182880" algn="l" rtl="0" eaLnBrk="1" latinLnBrk="0" hangingPunct="1">
         <a:spcBef>
           <a:spcPct val="20000"/>
         </a:spcBef>
-        <a:buFont typeface="Arial" panose="020B0604020202020204" pitchFamily="34" charset="0"/>
+        <a:buClr>
+          <a:schemeClr val="tx2"/>
+        </a:buClr>
         <a:buChar char="•"/>
-        <a:defRPr sz="2000" kern="1200">
+        <a:defRPr kumimoji="0" sz="1600" kern="1200">
           <a:solidFill>
             <a:schemeClr val="tx1"/>
           </a:solidFill>
@@ -2969,13 +3721,16 @@
           <a:cs typeface="+mn-cs"/>
         </a:defRPr>
       </a:lvl8pPr>
-      <a:lvl9pPr marL="3886200" indent="-228600" algn="l" defTabSz="914400" rtl="0" eaLnBrk="1" latinLnBrk="0" hangingPunct="1">
+      <a:lvl9pPr marL="2468880" indent="-182880" algn="l" rtl="0" eaLnBrk="1" latinLnBrk="0" hangingPunct="1">
         <a:spcBef>
           <a:spcPct val="20000"/>
         </a:spcBef>
-        <a:buFont typeface="Arial" panose="020B0604020202020204" pitchFamily="34" charset="0"/>
+        <a:buClr>
+          <a:schemeClr val="tx2"/>
+        </a:buClr>
+        <a:buFontTx/>
         <a:buChar char="•"/>
-        <a:defRPr sz="2000" kern="1200">
+        <a:defRPr kumimoji="0" sz="1400" kern="1200" baseline="0">
           <a:solidFill>
             <a:schemeClr val="tx1"/>
           </a:solidFill>
@@ -2986,11 +3741,8 @@
       </a:lvl9pPr>
     </p:bodyStyle>
     <p:otherStyle>
-      <a:defPPr>
-        <a:defRPr lang="it-IT"/>
-      </a:defPPr>
-      <a:lvl1pPr marL="0" algn="l" defTabSz="914400" rtl="0" eaLnBrk="1" latinLnBrk="0" hangingPunct="1">
-        <a:defRPr sz="1800" kern="1200">
+      <a:lvl1pPr marL="0" algn="l" rtl="0" eaLnBrk="1" latinLnBrk="0" hangingPunct="1">
+        <a:defRPr kumimoji="0" kern="1200">
           <a:solidFill>
             <a:schemeClr val="tx1"/>
           </a:solidFill>
@@ -2999,8 +3751,8 @@
           <a:cs typeface="+mn-cs"/>
         </a:defRPr>
       </a:lvl1pPr>
-      <a:lvl2pPr marL="457200" algn="l" defTabSz="914400" rtl="0" eaLnBrk="1" latinLnBrk="0" hangingPunct="1">
-        <a:defRPr sz="1800" kern="1200">
+      <a:lvl2pPr marL="457200" algn="l" rtl="0" eaLnBrk="1" latinLnBrk="0" hangingPunct="1">
+        <a:defRPr kumimoji="0" kern="1200">
           <a:solidFill>
             <a:schemeClr val="tx1"/>
           </a:solidFill>
@@ -3009,8 +3761,8 @@
           <a:cs typeface="+mn-cs"/>
         </a:defRPr>
       </a:lvl2pPr>
-      <a:lvl3pPr marL="914400" algn="l" defTabSz="914400" rtl="0" eaLnBrk="1" latinLnBrk="0" hangingPunct="1">
-        <a:defRPr sz="1800" kern="1200">
+      <a:lvl3pPr marL="914400" algn="l" rtl="0" eaLnBrk="1" latinLnBrk="0" hangingPunct="1">
+        <a:defRPr kumimoji="0" kern="1200">
           <a:solidFill>
             <a:schemeClr val="tx1"/>
           </a:solidFill>
@@ -3019,8 +3771,8 @@
           <a:cs typeface="+mn-cs"/>
         </a:defRPr>
       </a:lvl3pPr>
-      <a:lvl4pPr marL="1371600" algn="l" defTabSz="914400" rtl="0" eaLnBrk="1" latinLnBrk="0" hangingPunct="1">
-        <a:defRPr sz="1800" kern="1200">
+      <a:lvl4pPr marL="1371600" algn="l" rtl="0" eaLnBrk="1" latinLnBrk="0" hangingPunct="1">
+        <a:defRPr kumimoji="0" kern="1200">
           <a:solidFill>
             <a:schemeClr val="tx1"/>
           </a:solidFill>
@@ -3029,8 +3781,8 @@
           <a:cs typeface="+mn-cs"/>
         </a:defRPr>
       </a:lvl4pPr>
-      <a:lvl5pPr marL="1828800" algn="l" defTabSz="914400" rtl="0" eaLnBrk="1" latinLnBrk="0" hangingPunct="1">
-        <a:defRPr sz="1800" kern="1200">
+      <a:lvl5pPr marL="1828800" algn="l" rtl="0" eaLnBrk="1" latinLnBrk="0" hangingPunct="1">
+        <a:defRPr kumimoji="0" kern="1200">
           <a:solidFill>
             <a:schemeClr val="tx1"/>
           </a:solidFill>
@@ -3039,8 +3791,8 @@
           <a:cs typeface="+mn-cs"/>
         </a:defRPr>
       </a:lvl5pPr>
-      <a:lvl6pPr marL="2286000" algn="l" defTabSz="914400" rtl="0" eaLnBrk="1" latinLnBrk="0" hangingPunct="1">
-        <a:defRPr sz="1800" kern="1200">
+      <a:lvl6pPr marL="2286000" algn="l" rtl="0" eaLnBrk="1" latinLnBrk="0" hangingPunct="1">
+        <a:defRPr kumimoji="0" kern="1200">
           <a:solidFill>
             <a:schemeClr val="tx1"/>
           </a:solidFill>
@@ -3049,8 +3801,8 @@
           <a:cs typeface="+mn-cs"/>
         </a:defRPr>
       </a:lvl6pPr>
-      <a:lvl7pPr marL="2743200" algn="l" defTabSz="914400" rtl="0" eaLnBrk="1" latinLnBrk="0" hangingPunct="1">
-        <a:defRPr sz="1800" kern="1200">
+      <a:lvl7pPr marL="2743200" algn="l" rtl="0" eaLnBrk="1" latinLnBrk="0" hangingPunct="1">
+        <a:defRPr kumimoji="0" kern="1200">
           <a:solidFill>
             <a:schemeClr val="tx1"/>
           </a:solidFill>
@@ -3059,8 +3811,8 @@
           <a:cs typeface="+mn-cs"/>
         </a:defRPr>
       </a:lvl7pPr>
-      <a:lvl8pPr marL="3200400" algn="l" defTabSz="914400" rtl="0" eaLnBrk="1" latinLnBrk="0" hangingPunct="1">
-        <a:defRPr sz="1800" kern="1200">
+      <a:lvl8pPr marL="3200400" algn="l" rtl="0" eaLnBrk="1" latinLnBrk="0" hangingPunct="1">
+        <a:defRPr kumimoji="0" kern="1200">
           <a:solidFill>
             <a:schemeClr val="tx1"/>
           </a:solidFill>
@@ -3069,8 +3821,8 @@
           <a:cs typeface="+mn-cs"/>
         </a:defRPr>
       </a:lvl8pPr>
-      <a:lvl9pPr marL="3657600" algn="l" defTabSz="914400" rtl="0" eaLnBrk="1" latinLnBrk="0" hangingPunct="1">
-        <a:defRPr sz="1800" kern="1200">
+      <a:lvl9pPr marL="3657600" algn="l" rtl="0" eaLnBrk="1" latinLnBrk="0" hangingPunct="1">
+        <a:defRPr kumimoji="0" kern="1200">
           <a:solidFill>
             <a:schemeClr val="tx1"/>
           </a:solidFill>
@@ -3999,8 +4751,8 @@
         </p:blipFill>
         <p:spPr>
           <a:xfrm>
-            <a:off x="539552" y="1059582"/>
-            <a:ext cx="8136904" cy="3888432"/>
+            <a:off x="539552" y="1450975"/>
+            <a:ext cx="8064896" cy="3569047"/>
           </a:xfrm>
         </p:spPr>
       </p:pic>
@@ -4133,10 +4885,14 @@
           <a:lstStyle/>
           <a:p>
             <a:r>
-              <a:rPr lang="it-IT" dirty="0" smtClean="0"/>
+              <a:rPr lang="it-IT" dirty="0" smtClean="0">
+                <a:latin typeface="Cambria" panose="02040503050406030204" pitchFamily="18" charset="0"/>
+              </a:rPr>
               <a:t>Deployment</a:t>
             </a:r>
-            <a:endParaRPr lang="it-IT" dirty="0"/>
+            <a:endParaRPr lang="it-IT" dirty="0">
+              <a:latin typeface="Cambria" panose="02040503050406030204" pitchFamily="18" charset="0"/>
+            </a:endParaRPr>
           </a:p>
         </p:txBody>
       </p:sp>
@@ -4159,6 +4915,14 @@
               <a:buNone/>
             </a:pPr>
             <a:endParaRPr lang="it-IT" dirty="0"/>
+          </a:p>
+          <a:p>
+            <a:pPr marL="0" indent="0">
+              <a:buNone/>
+            </a:pPr>
+            <a:endParaRPr lang="it-IT" i="1" dirty="0" smtClean="0">
+              <a:latin typeface="Cambria" panose="02040503050406030204" pitchFamily="18" charset="0"/>
+            </a:endParaRPr>
           </a:p>
           <a:p>
             <a:pPr marL="0" indent="0">
@@ -4312,7 +5076,7 @@
                                         <p:tgtEl>
                                           <p:spTgt spid="3">
                                             <p:txEl>
-                                              <p:pRg st="1" end="1"/>
+                                              <p:pRg st="2" end="2"/>
                                             </p:txEl>
                                           </p:spTgt>
                                         </p:tgtEl>
@@ -4330,7 +5094,7 @@
                                         <p:tgtEl>
                                           <p:spTgt spid="3">
                                             <p:txEl>
-                                              <p:pRg st="1" end="1"/>
+                                              <p:pRg st="2" end="2"/>
                                             </p:txEl>
                                           </p:spTgt>
                                         </p:tgtEl>
@@ -4357,7 +5121,7 @@
                                         <p:tgtEl>
                                           <p:spTgt spid="3">
                                             <p:txEl>
-                                              <p:pRg st="1" end="1"/>
+                                              <p:pRg st="2" end="2"/>
                                             </p:txEl>
                                           </p:spTgt>
                                         </p:tgtEl>
@@ -4384,7 +5148,7 @@
                                         <p:tgtEl>
                                           <p:spTgt spid="3">
                                             <p:txEl>
-                                              <p:pRg st="1" end="1"/>
+                                              <p:pRg st="2" end="2"/>
                                             </p:txEl>
                                           </p:spTgt>
                                         </p:tgtEl>
@@ -4411,7 +5175,7 @@
                                         <p:tgtEl>
                                           <p:spTgt spid="3">
                                             <p:txEl>
-                                              <p:pRg st="1" end="1"/>
+                                              <p:pRg st="2" end="2"/>
                                             </p:txEl>
                                           </p:spTgt>
                                         </p:tgtEl>
@@ -4484,10 +5248,14 @@
           <a:lstStyle/>
           <a:p>
             <a:r>
-              <a:rPr lang="it-IT" dirty="0" smtClean="0"/>
+              <a:rPr lang="it-IT" dirty="0" smtClean="0">
+                <a:latin typeface="Cambria" panose="02040503050406030204" pitchFamily="18" charset="0"/>
+              </a:rPr>
               <a:t>Deployment</a:t>
             </a:r>
-            <a:endParaRPr lang="it-IT" dirty="0"/>
+            <a:endParaRPr lang="it-IT" dirty="0">
+              <a:latin typeface="Cambria" panose="02040503050406030204" pitchFamily="18" charset="0"/>
+            </a:endParaRPr>
           </a:p>
         </p:txBody>
       </p:sp>
@@ -4852,10 +5620,14 @@
           <a:lstStyle/>
           <a:p>
             <a:r>
-              <a:rPr lang="it-IT" dirty="0" smtClean="0"/>
+              <a:rPr lang="it-IT" dirty="0" smtClean="0">
+                <a:latin typeface="Cambria" panose="02040503050406030204" pitchFamily="18" charset="0"/>
+              </a:rPr>
               <a:t>Deployment</a:t>
             </a:r>
-            <a:endParaRPr lang="it-IT" dirty="0"/>
+            <a:endParaRPr lang="it-IT" dirty="0">
+              <a:latin typeface="Cambria" panose="02040503050406030204" pitchFamily="18" charset="0"/>
+            </a:endParaRPr>
           </a:p>
         </p:txBody>
       </p:sp>
@@ -5210,10 +5982,14 @@
           <a:lstStyle/>
           <a:p>
             <a:r>
-              <a:rPr lang="it-IT" dirty="0" smtClean="0"/>
+              <a:rPr lang="it-IT" dirty="0" smtClean="0">
+                <a:latin typeface="Cambria" panose="02040503050406030204" pitchFamily="18" charset="0"/>
+              </a:rPr>
               <a:t>Deployment</a:t>
             </a:r>
-            <a:endParaRPr lang="it-IT" dirty="0"/>
+            <a:endParaRPr lang="it-IT" dirty="0">
+              <a:latin typeface="Cambria" panose="02040503050406030204" pitchFamily="18" charset="0"/>
+            </a:endParaRPr>
           </a:p>
         </p:txBody>
       </p:sp>
@@ -5241,8 +6017,8 @@
         </p:blipFill>
         <p:spPr>
           <a:xfrm>
-            <a:off x="611560" y="987574"/>
-            <a:ext cx="7920880" cy="4032448"/>
+            <a:off x="683568" y="1450975"/>
+            <a:ext cx="7992888" cy="3569047"/>
           </a:xfrm>
         </p:spPr>
       </p:pic>
@@ -5343,9 +6119,9 @@
 </file>
 
 <file path=ppt/theme/theme1.xml><?xml version="1.0" encoding="utf-8"?>
-<a:theme xmlns:a="http://schemas.openxmlformats.org/drawingml/2006/main" name="Tema di Office">
+<a:theme xmlns:a="http://schemas.openxmlformats.org/drawingml/2006/main" name="Equinozio">
   <a:themeElements>
-    <a:clrScheme name="Office">
+    <a:clrScheme name="Equinozio">
       <a:dk1>
         <a:sysClr val="windowText" lastClr="000000"/>
       </a:dk1>
@@ -5353,81 +6129,46 @@
         <a:sysClr val="window" lastClr="FFFFFF"/>
       </a:lt1>
       <a:dk2>
-        <a:srgbClr val="1F497D"/>
+        <a:srgbClr val="04617B"/>
       </a:dk2>
       <a:lt2>
-        <a:srgbClr val="EEECE1"/>
+        <a:srgbClr val="DBF5F9"/>
       </a:lt2>
       <a:accent1>
-        <a:srgbClr val="4F81BD"/>
+        <a:srgbClr val="0F6FC6"/>
       </a:accent1>
       <a:accent2>
-        <a:srgbClr val="C0504D"/>
+        <a:srgbClr val="009DD9"/>
       </a:accent2>
       <a:accent3>
-        <a:srgbClr val="9BBB59"/>
+        <a:srgbClr val="0BD0D9"/>
       </a:accent3>
       <a:accent4>
-        <a:srgbClr val="8064A2"/>
+        <a:srgbClr val="10CF9B"/>
       </a:accent4>
       <a:accent5>
-        <a:srgbClr val="4BACC6"/>
+        <a:srgbClr val="7CCA62"/>
       </a:accent5>
       <a:accent6>
-        <a:srgbClr val="F79646"/>
+        <a:srgbClr val="A5C249"/>
       </a:accent6>
       <a:hlink>
-        <a:srgbClr val="0000FF"/>
+        <a:srgbClr val="F49100"/>
       </a:hlink>
       <a:folHlink>
-        <a:srgbClr val="800080"/>
+        <a:srgbClr val="85DFD0"/>
       </a:folHlink>
     </a:clrScheme>
-    <a:fontScheme name="Office">
+    <a:fontScheme name="Equinozio">
       <a:majorFont>
         <a:latin typeface="Calibri"/>
         <a:ea typeface=""/>
         <a:cs typeface=""/>
         <a:font script="Jpan" typeface="ＭＳ Ｐゴシック"/>
-        <a:font script="Hang" typeface="맑은 고딕"/>
-        <a:font script="Hans" typeface="宋体"/>
-        <a:font script="Hant" typeface="新細明體"/>
-        <a:font script="Arab" typeface="Times New Roman"/>
-        <a:font script="Hebr" typeface="Times New Roman"/>
-        <a:font script="Thai" typeface="Angsana New"/>
-        <a:font script="Ethi" typeface="Nyala"/>
-        <a:font script="Beng" typeface="Vrinda"/>
-        <a:font script="Gujr" typeface="Shruti"/>
-        <a:font script="Khmr" typeface="MoolBoran"/>
-        <a:font script="Knda" typeface="Tunga"/>
-        <a:font script="Guru" typeface="Raavi"/>
-        <a:font script="Cans" typeface="Euphemia"/>
-        <a:font script="Cher" typeface="Plantagenet Cherokee"/>
-        <a:font script="Yiii" typeface="Microsoft Yi Baiti"/>
-        <a:font script="Tibt" typeface="Microsoft Himalaya"/>
-        <a:font script="Thaa" typeface="MV Boli"/>
-        <a:font script="Deva" typeface="Mangal"/>
-        <a:font script="Telu" typeface="Gautami"/>
-        <a:font script="Taml" typeface="Latha"/>
-        <a:font script="Syrc" typeface="Estrangelo Edessa"/>
-        <a:font script="Orya" typeface="Kalinga"/>
-        <a:font script="Mlym" typeface="Kartika"/>
-        <a:font script="Laoo" typeface="DokChampa"/>
-        <a:font script="Sinh" typeface="Iskoola Pota"/>
-        <a:font script="Mong" typeface="Mongolian Baiti"/>
-        <a:font script="Viet" typeface="Times New Roman"/>
-        <a:font script="Uigh" typeface="Microsoft Uighur"/>
-        <a:font script="Geor" typeface="Sylfaen"/>
-      </a:majorFont>
-      <a:minorFont>
-        <a:latin typeface="Calibri"/>
-        <a:ea typeface=""/>
-        <a:cs typeface=""/>
-        <a:font script="Jpan" typeface="ＭＳ Ｐゴシック"/>
-        <a:font script="Hang" typeface="맑은 고딕"/>
-        <a:font script="Hans" typeface="宋体"/>
-        <a:font script="Hant" typeface="新細明體"/>
-        <a:font script="Arab" typeface="Arial"/>
+        <a:font script="Hang" typeface="HY중고딕"/>
+        <a:font script="Hans" typeface="隶书"/>
+        <a:font script="Hant" typeface="微軟正黑體"/>
+        <a:font script="Arab" typeface="Traditional Arabic"/>
         <a:font script="Hebr" typeface="Arial"/>
         <a:font script="Thai" typeface="Cordia New"/>
         <a:font script="Ethi" typeface="Nyala"/>
@@ -5452,10 +6193,43 @@
         <a:font script="Mong" typeface="Mongolian Baiti"/>
         <a:font script="Viet" typeface="Arial"/>
         <a:font script="Uigh" typeface="Microsoft Uighur"/>
-        <a:font script="Geor" typeface="Sylfaen"/>
+      </a:majorFont>
+      <a:minorFont>
+        <a:latin typeface="Constantia"/>
+        <a:ea typeface=""/>
+        <a:cs typeface=""/>
+        <a:font script="Jpan" typeface="HGP明朝E"/>
+        <a:font script="Hang" typeface="HY신명조"/>
+        <a:font script="Hans" typeface="宋体"/>
+        <a:font script="Hant" typeface="新細明體"/>
+        <a:font script="Arab" typeface="Majalla UI"/>
+        <a:font script="Hebr" typeface="David"/>
+        <a:font script="Thai" typeface="Browallia New"/>
+        <a:font script="Ethi" typeface="Nyala"/>
+        <a:font script="Beng" typeface="Vrinda"/>
+        <a:font script="Gujr" typeface="Shruti"/>
+        <a:font script="Khmr" typeface="MoolBoran"/>
+        <a:font script="Knda" typeface="Tunga"/>
+        <a:font script="Guru" typeface="Raavi"/>
+        <a:font script="Cans" typeface="Euphemia"/>
+        <a:font script="Cher" typeface="Plantagenet Cherokee"/>
+        <a:font script="Yiii" typeface="Microsoft Yi Baiti"/>
+        <a:font script="Tibt" typeface="Microsoft Himalaya"/>
+        <a:font script="Thaa" typeface="MV Boli"/>
+        <a:font script="Deva" typeface="Mangal"/>
+        <a:font script="Telu" typeface="Gautami"/>
+        <a:font script="Taml" typeface="Latha"/>
+        <a:font script="Syrc" typeface="Estrangelo Edessa"/>
+        <a:font script="Orya" typeface="Kalinga"/>
+        <a:font script="Mlym" typeface="Kartika"/>
+        <a:font script="Laoo" typeface="DokChampa"/>
+        <a:font script="Sinh" typeface="Iskoola Pota"/>
+        <a:font script="Mong" typeface="Mongolian Baiti"/>
+        <a:font script="Viet" typeface="Times New Roman"/>
+        <a:font script="Uigh" typeface="Microsoft Uighur"/>
       </a:minorFont>
     </a:fontScheme>
-    <a:fmtScheme name="Office">
+    <a:fmtScheme name="Equinozio">
       <a:fillStyleLst>
         <a:solidFill>
           <a:schemeClr val="phClr"/>
@@ -5464,55 +6238,66 @@
           <a:gsLst>
             <a:gs pos="0">
               <a:schemeClr val="phClr">
-                <a:tint val="50000"/>
-                <a:satMod val="300000"/>
+                <a:tint val="70000"/>
+                <a:satMod val="130000"/>
               </a:schemeClr>
             </a:gs>
-            <a:gs pos="35000">
+            <a:gs pos="43000">
               <a:schemeClr val="phClr">
-                <a:tint val="37000"/>
-                <a:satMod val="300000"/>
+                <a:tint val="44000"/>
+                <a:satMod val="165000"/>
+              </a:schemeClr>
+            </a:gs>
+            <a:gs pos="93000">
+              <a:schemeClr val="phClr">
+                <a:tint val="15000"/>
+                <a:satMod val="165000"/>
               </a:schemeClr>
             </a:gs>
             <a:gs pos="100000">
               <a:schemeClr val="phClr">
-                <a:tint val="15000"/>
-                <a:satMod val="350000"/>
+                <a:tint val="5000"/>
+                <a:satMod val="250000"/>
               </a:schemeClr>
             </a:gs>
           </a:gsLst>
-          <a:lin ang="16200000" scaled="1"/>
+          <a:path path="circle">
+            <a:fillToRect l="50000" t="130000" r="50000" b="-30000"/>
+          </a:path>
         </a:gradFill>
         <a:gradFill rotWithShape="1">
           <a:gsLst>
             <a:gs pos="0">
               <a:schemeClr val="phClr">
-                <a:shade val="51000"/>
-                <a:satMod val="130000"/>
+                <a:tint val="98000"/>
+                <a:shade val="25000"/>
+                <a:satMod val="250000"/>
               </a:schemeClr>
             </a:gs>
-            <a:gs pos="80000">
+            <a:gs pos="68000">
               <a:schemeClr val="phClr">
-                <a:shade val="93000"/>
-                <a:satMod val="130000"/>
+                <a:tint val="86000"/>
+                <a:satMod val="115000"/>
               </a:schemeClr>
             </a:gs>
             <a:gs pos="100000">
               <a:schemeClr val="phClr">
-                <a:shade val="94000"/>
-                <a:satMod val="135000"/>
+                <a:tint val="50000"/>
+                <a:satMod val="150000"/>
               </a:schemeClr>
             </a:gs>
           </a:gsLst>
-          <a:lin ang="16200000" scaled="0"/>
+          <a:path path="circle">
+            <a:fillToRect l="50000" t="130000" r="50000" b="-30000"/>
+          </a:path>
         </a:gradFill>
       </a:fillStyleLst>
       <a:lnStyleLst>
         <a:ln w="9525" cap="flat" cmpd="sng" algn="ctr">
           <a:solidFill>
             <a:schemeClr val="phClr">
-              <a:shade val="95000"/>
-              <a:satMod val="105000"/>
+              <a:shade val="50000"/>
+              <a:satMod val="103000"/>
             </a:schemeClr>
           </a:solidFill>
           <a:prstDash val="solid"/>
@@ -5533,40 +6318,46 @@
       <a:effectStyleLst>
         <a:effectStyle>
           <a:effectLst>
-            <a:outerShdw blurRad="40000" dist="20000" dir="5400000" rotWithShape="0">
-              <a:srgbClr val="000000">
-                <a:alpha val="38000"/>
-              </a:srgbClr>
+            <a:outerShdw blurRad="57150" dist="38100" dir="5400000" algn="ctr" rotWithShape="0">
+              <a:schemeClr val="phClr">
+                <a:shade val="9000"/>
+                <a:alpha val="48000"/>
+                <a:satMod val="105000"/>
+              </a:schemeClr>
             </a:outerShdw>
           </a:effectLst>
         </a:effectStyle>
         <a:effectStyle>
           <a:effectLst>
-            <a:outerShdw blurRad="40000" dist="23000" dir="5400000" rotWithShape="0">
-              <a:srgbClr val="000000">
-                <a:alpha val="35000"/>
-              </a:srgbClr>
+            <a:outerShdw blurRad="57150" dist="38100" dir="5400000" algn="ctr" rotWithShape="0">
+              <a:schemeClr val="phClr">
+                <a:shade val="9000"/>
+                <a:alpha val="48000"/>
+                <a:satMod val="105000"/>
+              </a:schemeClr>
             </a:outerShdw>
           </a:effectLst>
         </a:effectStyle>
         <a:effectStyle>
           <a:effectLst>
-            <a:outerShdw blurRad="40000" dist="23000" dir="5400000" rotWithShape="0">
-              <a:srgbClr val="000000">
-                <a:alpha val="35000"/>
-              </a:srgbClr>
+            <a:outerShdw blurRad="57150" dist="38100" dir="5400000" algn="ctr" rotWithShape="0">
+              <a:schemeClr val="phClr">
+                <a:shade val="9000"/>
+                <a:alpha val="48000"/>
+                <a:satMod val="105000"/>
+              </a:schemeClr>
             </a:outerShdw>
           </a:effectLst>
           <a:scene3d>
             <a:camera prst="orthographicFront">
               <a:rot lat="0" lon="0" rev="0"/>
             </a:camera>
-            <a:lightRig rig="threePt" dir="t">
-              <a:rot lat="0" lon="0" rev="1200000"/>
+            <a:lightRig rig="glow" dir="tl">
+              <a:rot lat="0" lon="0" rev="900000"/>
             </a:lightRig>
           </a:scene3d>
-          <a:sp3d>
-            <a:bevelT w="63500" h="25400"/>
+          <a:sp3d prstMaterial="powder">
+            <a:bevelT w="25400" h="38100"/>
           </a:sp3d>
         </a:effectStyle>
       </a:effectStyleLst>
@@ -5578,47 +6369,42 @@
           <a:gsLst>
             <a:gs pos="0">
               <a:schemeClr val="phClr">
-                <a:tint val="40000"/>
-                <a:satMod val="350000"/>
+                <a:tint val="80000"/>
+                <a:satMod val="400000"/>
               </a:schemeClr>
             </a:gs>
-            <a:gs pos="40000">
+            <a:gs pos="25000">
               <a:schemeClr val="phClr">
-                <a:tint val="45000"/>
-                <a:shade val="99000"/>
-                <a:satMod val="350000"/>
+                <a:tint val="83000"/>
+                <a:satMod val="320000"/>
               </a:schemeClr>
             </a:gs>
             <a:gs pos="100000">
               <a:schemeClr val="phClr">
-                <a:shade val="20000"/>
-                <a:satMod val="255000"/>
+                <a:shade val="15000"/>
+                <a:satMod val="320000"/>
               </a:schemeClr>
             </a:gs>
           </a:gsLst>
           <a:path path="circle">
-            <a:fillToRect l="50000" t="-80000" r="50000" b="180000"/>
+            <a:fillToRect l="10000" t="110000" r="10000" b="100000"/>
           </a:path>
         </a:gradFill>
-        <a:gradFill rotWithShape="1">
-          <a:gsLst>
-            <a:gs pos="0">
+        <a:blipFill>
+          <a:blip xmlns:r="http://schemas.openxmlformats.org/officeDocument/2006/relationships" r:embed="rId1">
+            <a:duotone>
               <a:schemeClr val="phClr">
-                <a:tint val="80000"/>
-                <a:satMod val="300000"/>
+                <a:shade val="90000"/>
+                <a:satMod val="150000"/>
               </a:schemeClr>
-            </a:gs>
-            <a:gs pos="100000">
               <a:schemeClr val="phClr">
-                <a:shade val="30000"/>
-                <a:satMod val="200000"/>
+                <a:tint val="88000"/>
+                <a:satMod val="150000"/>
               </a:schemeClr>
-            </a:gs>
-          </a:gsLst>
-          <a:path path="circle">
-            <a:fillToRect l="50000" t="50000" r="50000" b="50000"/>
-          </a:path>
-        </a:gradFill>
+            </a:duotone>
+          </a:blip>
+          <a:tile tx="0" ty="0" sx="65000" sy="65000" flip="none" algn="tl"/>
+        </a:blipFill>
       </a:bgFillStyleLst>
     </a:fmtScheme>
   </a:themeElements>

</xml_diff>